<commit_message>
oox smartart, cycle matrix: handle left/bottom constraint in composite algo
The bugdoc has 3 shapes in the "outer" circle which have a position
where either x or y is not 0. But these are defined using constraints
talking about the right or bottom edge of the shape.

Map that to top/left, given that we already know the shape size.

Change-Id: If7ccc2fb642046eb53b48c8b2c2b2c6b023ba9e8
Reviewed-on: https://gerrit.libreoffice.org/67544
Reviewed-by: Miklos Vajna <vmiklos@collabora.com>
Tested-by: Jenkins
</commit_message>
<xml_diff>
--- a/sd/qa/unit/data/pptx/smartart-cycle-matrix.pptx
+++ b/sd/qa/unit/data/pptx/smartart-cycle-matrix.pptx
@@ -857,8 +857,8 @@
 <file path=ppt/diagrams/data1.xml><?xml version="1.0" encoding="utf-8"?>
 <dgm:dataModel xmlns:dgm="http://schemas.openxmlformats.org/drawingml/2006/diagram" xmlns:a="http://schemas.openxmlformats.org/drawingml/2006/main">
   <dgm:ptLst>
-    <dgm:pt modelId="{7A76136E-42B0-407A-9E3C-35F577E22FEA}" type="doc">
-      <dgm:prSet loTypeId="urn:microsoft.com/office/officeart/2005/8/layout/cycle4#13" loCatId="cycle" qsTypeId="urn:microsoft.com/office/officeart/2005/8/quickstyle/simple2" qsCatId="simple" csTypeId="urn:microsoft.com/office/officeart/2005/8/colors/accent1_2" csCatId="accent1" phldr="1"/>
+    <dgm:pt modelId="{003654E0-9E18-4D5E-982E-B9794BA45E9A}" type="doc">
+      <dgm:prSet loTypeId="urn:microsoft.com/office/officeart/2005/8/layout/cycle4" loCatId="cycle" qsTypeId="urn:microsoft.com/office/officeart/2005/8/quickstyle/simple2" qsCatId="simple" csTypeId="urn:microsoft.com/office/officeart/2005/8/colors/accent1_2" csCatId="accent1" phldr="1"/>
       <dgm:spPr/>
       <dgm:t>
         <a:bodyPr/>
@@ -868,7 +868,7 @@
         </a:p>
       </dgm:t>
     </dgm:pt>
-    <dgm:pt modelId="{881D9D21-7E8D-401C-A24C-C32B7AB614AA}">
+    <dgm:pt modelId="{599E7BAD-D9C8-4140-986F-65ED966AE095}">
       <dgm:prSet phldrT="[Text]"/>
       <dgm:spPr/>
       <dgm:t>
@@ -883,7 +883,7 @@
         </a:p>
       </dgm:t>
     </dgm:pt>
-    <dgm:pt modelId="{4E9EDC70-3FFC-459B-8C26-1AAEC47C4CB8}" type="parTrans" cxnId="{ACC3FC6A-2DF9-41A2-859F-93696ADC2FB6}">
+    <dgm:pt modelId="{71CF6D46-33FF-47FF-A47B-BE31BD4CC152}" type="parTrans" cxnId="{97AD37F4-F38C-4200-8244-0F4969190F2B}">
       <dgm:prSet/>
       <dgm:spPr/>
       <dgm:t>
@@ -894,7 +894,7 @@
         </a:p>
       </dgm:t>
     </dgm:pt>
-    <dgm:pt modelId="{8CC1C4E0-A0F1-4A06-8CA4-D3057A2B9C31}" type="sibTrans" cxnId="{ACC3FC6A-2DF9-41A2-859F-93696ADC2FB6}">
+    <dgm:pt modelId="{826A52B2-7700-4B45-B545-7B221F74AE69}" type="sibTrans" cxnId="{97AD37F4-F38C-4200-8244-0F4969190F2B}">
       <dgm:prSet/>
       <dgm:spPr/>
       <dgm:t>
@@ -905,7 +905,7 @@
         </a:p>
       </dgm:t>
     </dgm:pt>
-    <dgm:pt modelId="{A0EA9376-C593-4244-8E64-7081B7D7B8B4}">
+    <dgm:pt modelId="{6BD59895-F20B-4F11-AAF0-4DBB9E4B09A3}">
       <dgm:prSet phldrT="[Text]"/>
       <dgm:spPr/>
       <dgm:t>
@@ -920,7 +920,7 @@
         </a:p>
       </dgm:t>
     </dgm:pt>
-    <dgm:pt modelId="{72F46624-9447-40DD-9D16-8F702D8E4978}" type="parTrans" cxnId="{CB6DC5E4-099B-495B-95CF-24A784E80DAF}">
+    <dgm:pt modelId="{43165439-FD40-4572-BFA2-0E332F7AC200}" type="parTrans" cxnId="{AF512D4B-9F3E-49E0-85E7-B842EE6BF609}">
       <dgm:prSet/>
       <dgm:spPr/>
       <dgm:t>
@@ -931,7 +931,7 @@
         </a:p>
       </dgm:t>
     </dgm:pt>
-    <dgm:pt modelId="{06B1B16B-BD96-40B7-875E-D9C3F0AC4644}" type="sibTrans" cxnId="{CB6DC5E4-099B-495B-95CF-24A784E80DAF}">
+    <dgm:pt modelId="{576F2714-2620-4DD8-A983-23EA4E9C8EAB}" type="sibTrans" cxnId="{AF512D4B-9F3E-49E0-85E7-B842EE6BF609}">
       <dgm:prSet/>
       <dgm:spPr/>
       <dgm:t>
@@ -942,15 +942,23 @@
         </a:p>
       </dgm:t>
     </dgm:pt>
-    <dgm:pt modelId="{FA510CA3-8E9F-460B-9BB7-0697F135BCD9}" type="pres">
-      <dgm:prSet presAssocID="{7A76136E-42B0-407A-9E3C-35F577E22FEA}" presName="cycleMatrixDiagram" presStyleCnt="0">
-        <dgm:presLayoutVars>
-          <dgm:chMax val="1"/>
-          <dgm:dir/>
-          <dgm:animLvl val="lvl"/>
-          <dgm:resizeHandles val="exact"/>
-        </dgm:presLayoutVars>
-      </dgm:prSet>
+    <dgm:pt modelId="{C1162557-9B22-4E88-A090-5FF51D5B8295}">
+      <dgm:prSet phldrT="[Text]"/>
+      <dgm:spPr/>
+      <dgm:t>
+        <a:bodyPr/>
+        <a:lstStyle/>
+        <a:p>
+          <a:r>
+            <a:rPr lang="en-US" dirty="0" smtClean="0"/>
+            <a:t>B1</a:t>
+          </a:r>
+          <a:endParaRPr lang="en-US" dirty="0"/>
+        </a:p>
+      </dgm:t>
+    </dgm:pt>
+    <dgm:pt modelId="{2191C118-335A-49FA-89A4-87D7CCA9BE16}" type="parTrans" cxnId="{0F329598-6CAC-4DB4-996F-27934E3F0BB8}">
+      <dgm:prSet/>
       <dgm:spPr/>
       <dgm:t>
         <a:bodyPr/>
@@ -960,16 +968,8 @@
         </a:p>
       </dgm:t>
     </dgm:pt>
-    <dgm:pt modelId="{32A9AAED-5593-487B-87D4-4D7E1DF31145}" type="pres">
-      <dgm:prSet presAssocID="{7A76136E-42B0-407A-9E3C-35F577E22FEA}" presName="children" presStyleCnt="0"/>
-      <dgm:spPr/>
-    </dgm:pt>
-    <dgm:pt modelId="{E4A16927-20DD-43BC-9852-A49CA30E8CDB}" type="pres">
-      <dgm:prSet presAssocID="{7A76136E-42B0-407A-9E3C-35F577E22FEA}" presName="child1group" presStyleCnt="0"/>
-      <dgm:spPr/>
-    </dgm:pt>
-    <dgm:pt modelId="{13566014-1BCD-4D84-AF3A-9F0BAF12B41F}" type="pres">
-      <dgm:prSet presAssocID="{7A76136E-42B0-407A-9E3C-35F577E22FEA}" presName="child1" presStyleLbl="bgAcc1" presStyleIdx="0" presStyleCnt="1"/>
+    <dgm:pt modelId="{A9641CE4-75BE-4FAA-91B5-93BFC98D9D72}" type="sibTrans" cxnId="{0F329598-6CAC-4DB4-996F-27934E3F0BB8}">
+      <dgm:prSet/>
       <dgm:spPr/>
       <dgm:t>
         <a:bodyPr/>
@@ -979,12 +979,23 @@
         </a:p>
       </dgm:t>
     </dgm:pt>
-    <dgm:pt modelId="{A734AB44-D93C-4920-B4A6-E1F058AC63EF}" type="pres">
-      <dgm:prSet presAssocID="{7A76136E-42B0-407A-9E3C-35F577E22FEA}" presName="child1Text" presStyleLbl="bgAcc1" presStyleIdx="0" presStyleCnt="1">
-        <dgm:presLayoutVars>
-          <dgm:bulletEnabled val="1"/>
-        </dgm:presLayoutVars>
-      </dgm:prSet>
+    <dgm:pt modelId="{0724DAD8-2A69-4A1A-8F15-338B8B15E6F2}">
+      <dgm:prSet phldrT="[Text]"/>
+      <dgm:spPr/>
+      <dgm:t>
+        <a:bodyPr/>
+        <a:lstStyle/>
+        <a:p>
+          <a:r>
+            <a:rPr lang="en-US" dirty="0" smtClean="0"/>
+            <a:t>B2</a:t>
+          </a:r>
+          <a:endParaRPr lang="en-US" dirty="0"/>
+        </a:p>
+      </dgm:t>
+    </dgm:pt>
+    <dgm:pt modelId="{16EF8677-2289-48A6-92BB-A7F00928933E}" type="parTrans" cxnId="{458E33E6-4CAA-4C6A-B5EA-81E128FE692A}">
+      <dgm:prSet/>
       <dgm:spPr/>
       <dgm:t>
         <a:bodyPr/>
@@ -994,16 +1005,272 @@
         </a:p>
       </dgm:t>
     </dgm:pt>
-    <dgm:pt modelId="{337AB61B-3B71-48B0-ACDD-E026E0F84013}" type="pres">
-      <dgm:prSet presAssocID="{7A76136E-42B0-407A-9E3C-35F577E22FEA}" presName="childPlaceholder" presStyleCnt="0"/>
+    <dgm:pt modelId="{C39FC2A2-A0AE-4238-8780-E13778590D70}" type="sibTrans" cxnId="{458E33E6-4CAA-4C6A-B5EA-81E128FE692A}">
+      <dgm:prSet/>
+      <dgm:spPr/>
+      <dgm:t>
+        <a:bodyPr/>
+        <a:lstStyle/>
+        <a:p>
+          <a:endParaRPr lang="en-US"/>
+        </a:p>
+      </dgm:t>
+    </dgm:pt>
+    <dgm:pt modelId="{3F8B8820-33BE-41F6-8C9D-CB004C05B899}">
+      <dgm:prSet phldrT="[Text]"/>
+      <dgm:spPr/>
+      <dgm:t>
+        <a:bodyPr/>
+        <a:lstStyle/>
+        <a:p>
+          <a:r>
+            <a:rPr lang="en-US" dirty="0" smtClean="0"/>
+            <a:t>C1</a:t>
+          </a:r>
+          <a:endParaRPr lang="en-US" dirty="0"/>
+        </a:p>
+      </dgm:t>
+    </dgm:pt>
+    <dgm:pt modelId="{01D3A64B-7D8F-4C8A-9559-CB9C2201D747}" type="parTrans" cxnId="{3EA93CE7-9993-487E-97ED-D8FB1678C77D}">
+      <dgm:prSet/>
+      <dgm:spPr/>
+      <dgm:t>
+        <a:bodyPr/>
+        <a:lstStyle/>
+        <a:p>
+          <a:endParaRPr lang="en-US"/>
+        </a:p>
+      </dgm:t>
+    </dgm:pt>
+    <dgm:pt modelId="{E7C6F197-2BAC-4B70-8004-D60E2FB73279}" type="sibTrans" cxnId="{3EA93CE7-9993-487E-97ED-D8FB1678C77D}">
+      <dgm:prSet/>
+      <dgm:spPr/>
+      <dgm:t>
+        <a:bodyPr/>
+        <a:lstStyle/>
+        <a:p>
+          <a:endParaRPr lang="en-US"/>
+        </a:p>
+      </dgm:t>
+    </dgm:pt>
+    <dgm:pt modelId="{304AE478-6D78-4015-872C-96449D81B928}">
+      <dgm:prSet phldrT="[Text]"/>
+      <dgm:spPr/>
+      <dgm:t>
+        <a:bodyPr/>
+        <a:lstStyle/>
+        <a:p>
+          <a:r>
+            <a:rPr lang="en-US" dirty="0" smtClean="0"/>
+            <a:t>C2</a:t>
+          </a:r>
+          <a:endParaRPr lang="en-US" dirty="0"/>
+        </a:p>
+      </dgm:t>
+    </dgm:pt>
+    <dgm:pt modelId="{9B61C3E6-2FD2-4BE7-8E3A-74F1B9CEF8A0}" type="parTrans" cxnId="{2D6BE06D-8699-4D8C-8DC9-F85784EE3E94}">
+      <dgm:prSet/>
+      <dgm:spPr/>
+      <dgm:t>
+        <a:bodyPr/>
+        <a:lstStyle/>
+        <a:p>
+          <a:endParaRPr lang="en-US"/>
+        </a:p>
+      </dgm:t>
+    </dgm:pt>
+    <dgm:pt modelId="{9BA2EC1C-6DD4-40CB-A0BB-CB90F7F19AD8}" type="sibTrans" cxnId="{2D6BE06D-8699-4D8C-8DC9-F85784EE3E94}">
+      <dgm:prSet/>
+      <dgm:spPr/>
+      <dgm:t>
+        <a:bodyPr/>
+        <a:lstStyle/>
+        <a:p>
+          <a:endParaRPr lang="en-US"/>
+        </a:p>
+      </dgm:t>
+    </dgm:pt>
+    <dgm:pt modelId="{4CCE717E-3DF3-496D-96B6-14B62FE6A965}">
+      <dgm:prSet phldrT="[Text]"/>
+      <dgm:spPr/>
+      <dgm:t>
+        <a:bodyPr/>
+        <a:lstStyle/>
+        <a:p>
+          <a:r>
+            <a:rPr lang="en-US" dirty="0" smtClean="0"/>
+            <a:t>D1</a:t>
+          </a:r>
+          <a:endParaRPr lang="en-US" dirty="0"/>
+        </a:p>
+      </dgm:t>
+    </dgm:pt>
+    <dgm:pt modelId="{4D8BCB9F-502C-4C58-8270-6CE8EEAD19EC}" type="parTrans" cxnId="{E2D4C9EB-EE0B-4625-968D-17652BF06CC0}">
+      <dgm:prSet/>
+      <dgm:spPr/>
+      <dgm:t>
+        <a:bodyPr/>
+        <a:lstStyle/>
+        <a:p>
+          <a:endParaRPr lang="en-US"/>
+        </a:p>
+      </dgm:t>
+    </dgm:pt>
+    <dgm:pt modelId="{BFD8F682-3F4E-49DE-906B-38A5613F7665}" type="sibTrans" cxnId="{E2D4C9EB-EE0B-4625-968D-17652BF06CC0}">
+      <dgm:prSet/>
+      <dgm:spPr/>
+      <dgm:t>
+        <a:bodyPr/>
+        <a:lstStyle/>
+        <a:p>
+          <a:endParaRPr lang="en-US"/>
+        </a:p>
+      </dgm:t>
+    </dgm:pt>
+    <dgm:pt modelId="{B2CCC5D8-B694-4307-90EF-DA94FDE9E13F}">
+      <dgm:prSet phldrT="[Text]"/>
+      <dgm:spPr/>
+      <dgm:t>
+        <a:bodyPr/>
+        <a:lstStyle/>
+        <a:p>
+          <a:r>
+            <a:rPr lang="en-US" dirty="0" smtClean="0"/>
+            <a:t>D2</a:t>
+          </a:r>
+          <a:endParaRPr lang="en-US" dirty="0"/>
+        </a:p>
+      </dgm:t>
+    </dgm:pt>
+    <dgm:pt modelId="{48857B38-8F70-4172-BB19-54AE3B9822EB}" type="parTrans" cxnId="{7D47BDCA-499F-4C58-B4BF-743D02652485}">
+      <dgm:prSet/>
+      <dgm:spPr/>
+      <dgm:t>
+        <a:bodyPr/>
+        <a:lstStyle/>
+        <a:p>
+          <a:endParaRPr lang="en-US"/>
+        </a:p>
+      </dgm:t>
+    </dgm:pt>
+    <dgm:pt modelId="{9DE5CBD8-A66B-4661-B385-25E7B653CBBB}" type="sibTrans" cxnId="{7D47BDCA-499F-4C58-B4BF-743D02652485}">
+      <dgm:prSet/>
+      <dgm:spPr/>
+      <dgm:t>
+        <a:bodyPr/>
+        <a:lstStyle/>
+        <a:p>
+          <a:endParaRPr lang="en-US"/>
+        </a:p>
+      </dgm:t>
+    </dgm:pt>
+    <dgm:pt modelId="{15F91B88-19C7-4EFA-8B15-292C03FBB2EF}" type="pres">
+      <dgm:prSet presAssocID="{003654E0-9E18-4D5E-982E-B9794BA45E9A}" presName="cycleMatrixDiagram" presStyleCnt="0">
+        <dgm:presLayoutVars>
+          <dgm:chMax val="1"/>
+          <dgm:dir/>
+          <dgm:animLvl val="lvl"/>
+          <dgm:resizeHandles val="exact"/>
+        </dgm:presLayoutVars>
+      </dgm:prSet>
       <dgm:spPr/>
     </dgm:pt>
-    <dgm:pt modelId="{198E7E4D-3128-4553-864F-BAC5DFA3ECA2}" type="pres">
-      <dgm:prSet presAssocID="{7A76136E-42B0-407A-9E3C-35F577E22FEA}" presName="circle" presStyleCnt="0"/>
+    <dgm:pt modelId="{77E2984E-B177-46C9-A01F-4DFD59131FBB}" type="pres">
+      <dgm:prSet presAssocID="{003654E0-9E18-4D5E-982E-B9794BA45E9A}" presName="children" presStyleCnt="0"/>
       <dgm:spPr/>
     </dgm:pt>
-    <dgm:pt modelId="{CF943B87-6C18-4D87-9DCC-99D0D7FC51EF}" type="pres">
-      <dgm:prSet presAssocID="{7A76136E-42B0-407A-9E3C-35F577E22FEA}" presName="quadrant1" presStyleLbl="node1" presStyleIdx="0" presStyleCnt="4">
+    <dgm:pt modelId="{EA121366-D4D8-431F-9558-3AF41209029F}" type="pres">
+      <dgm:prSet presAssocID="{003654E0-9E18-4D5E-982E-B9794BA45E9A}" presName="child1group" presStyleCnt="0"/>
+      <dgm:spPr/>
+    </dgm:pt>
+    <dgm:pt modelId="{C05466EF-19FA-453C-990A-DAAB7AC0AFD3}" type="pres">
+      <dgm:prSet presAssocID="{003654E0-9E18-4D5E-982E-B9794BA45E9A}" presName="child1" presStyleLbl="bgAcc1" presStyleIdx="0" presStyleCnt="4"/>
+      <dgm:spPr/>
+    </dgm:pt>
+    <dgm:pt modelId="{526254A8-069C-4F53-8414-9E825075309B}" type="pres">
+      <dgm:prSet presAssocID="{003654E0-9E18-4D5E-982E-B9794BA45E9A}" presName="child1Text" presStyleLbl="bgAcc1" presStyleIdx="0" presStyleCnt="4">
+        <dgm:presLayoutVars>
+          <dgm:bulletEnabled val="1"/>
+        </dgm:presLayoutVars>
+      </dgm:prSet>
+      <dgm:spPr/>
+    </dgm:pt>
+    <dgm:pt modelId="{1E304393-B545-4646-ACCF-B4EBD4E4E64B}" type="pres">
+      <dgm:prSet presAssocID="{003654E0-9E18-4D5E-982E-B9794BA45E9A}" presName="child2group" presStyleCnt="0"/>
+      <dgm:spPr/>
+    </dgm:pt>
+    <dgm:pt modelId="{51FCF558-D603-4FFA-9BCD-09AEF65F6FC2}" type="pres">
+      <dgm:prSet presAssocID="{003654E0-9E18-4D5E-982E-B9794BA45E9A}" presName="child2" presStyleLbl="bgAcc1" presStyleIdx="1" presStyleCnt="4"/>
+      <dgm:spPr/>
+    </dgm:pt>
+    <dgm:pt modelId="{0749C027-4B27-4B84-BFD3-16D8440F6A32}" type="pres">
+      <dgm:prSet presAssocID="{003654E0-9E18-4D5E-982E-B9794BA45E9A}" presName="child2Text" presStyleLbl="bgAcc1" presStyleIdx="1" presStyleCnt="4">
+        <dgm:presLayoutVars>
+          <dgm:bulletEnabled val="1"/>
+        </dgm:presLayoutVars>
+      </dgm:prSet>
+      <dgm:spPr/>
+    </dgm:pt>
+    <dgm:pt modelId="{1DC2898C-7A4C-40C0-B642-C211A7FD2C7D}" type="pres">
+      <dgm:prSet presAssocID="{003654E0-9E18-4D5E-982E-B9794BA45E9A}" presName="child3group" presStyleCnt="0"/>
+      <dgm:spPr/>
+    </dgm:pt>
+    <dgm:pt modelId="{089BF8AA-A8C8-467E-BB04-9D3FBCD354A8}" type="pres">
+      <dgm:prSet presAssocID="{003654E0-9E18-4D5E-982E-B9794BA45E9A}" presName="child3" presStyleLbl="bgAcc1" presStyleIdx="2" presStyleCnt="4"/>
+      <dgm:spPr/>
+    </dgm:pt>
+    <dgm:pt modelId="{560839B1-6C83-4472-81FB-A55CE4A88370}" type="pres">
+      <dgm:prSet presAssocID="{003654E0-9E18-4D5E-982E-B9794BA45E9A}" presName="child3Text" presStyleLbl="bgAcc1" presStyleIdx="2" presStyleCnt="4">
+        <dgm:presLayoutVars>
+          <dgm:bulletEnabled val="1"/>
+        </dgm:presLayoutVars>
+      </dgm:prSet>
+      <dgm:spPr/>
+    </dgm:pt>
+    <dgm:pt modelId="{42AD15FB-06C4-4A5B-B01A-A1E68CA56757}" type="pres">
+      <dgm:prSet presAssocID="{003654E0-9E18-4D5E-982E-B9794BA45E9A}" presName="child4group" presStyleCnt="0"/>
+      <dgm:spPr/>
+    </dgm:pt>
+    <dgm:pt modelId="{FD063360-877F-494F-B6E0-C669D22636DB}" type="pres">
+      <dgm:prSet presAssocID="{003654E0-9E18-4D5E-982E-B9794BA45E9A}" presName="child4" presStyleLbl="bgAcc1" presStyleIdx="3" presStyleCnt="4"/>
+      <dgm:spPr/>
+    </dgm:pt>
+    <dgm:pt modelId="{6882F1B9-F3A5-4D6C-8E1C-7A2A04343C7C}" type="pres">
+      <dgm:prSet presAssocID="{003654E0-9E18-4D5E-982E-B9794BA45E9A}" presName="child4Text" presStyleLbl="bgAcc1" presStyleIdx="3" presStyleCnt="4">
+        <dgm:presLayoutVars>
+          <dgm:bulletEnabled val="1"/>
+        </dgm:presLayoutVars>
+      </dgm:prSet>
+      <dgm:spPr/>
+    </dgm:pt>
+    <dgm:pt modelId="{BE2CBB36-39BC-41DE-88EB-49DECF328A8D}" type="pres">
+      <dgm:prSet presAssocID="{003654E0-9E18-4D5E-982E-B9794BA45E9A}" presName="childPlaceholder" presStyleCnt="0"/>
+      <dgm:spPr/>
+    </dgm:pt>
+    <dgm:pt modelId="{6E6C9ABC-0C5E-40D8-B9C3-D59F082FF25B}" type="pres">
+      <dgm:prSet presAssocID="{003654E0-9E18-4D5E-982E-B9794BA45E9A}" presName="circle" presStyleCnt="0"/>
+      <dgm:spPr/>
+    </dgm:pt>
+    <dgm:pt modelId="{D61DF2A0-61BE-486A-9D59-BB3A3C9817A5}" type="pres">
+      <dgm:prSet presAssocID="{003654E0-9E18-4D5E-982E-B9794BA45E9A}" presName="quadrant1" presStyleLbl="node1" presStyleIdx="0" presStyleCnt="4">
+        <dgm:presLayoutVars>
+          <dgm:chMax val="1"/>
+          <dgm:bulletEnabled val="1"/>
+        </dgm:presLayoutVars>
+      </dgm:prSet>
+      <dgm:spPr/>
+    </dgm:pt>
+    <dgm:pt modelId="{47FAC8C8-7BE1-4962-8E2E-D0AFDDAB8BCB}" type="pres">
+      <dgm:prSet presAssocID="{003654E0-9E18-4D5E-982E-B9794BA45E9A}" presName="quadrant2" presStyleLbl="node1" presStyleIdx="1" presStyleCnt="4">
+        <dgm:presLayoutVars>
+          <dgm:chMax val="1"/>
+          <dgm:bulletEnabled val="1"/>
+        </dgm:presLayoutVars>
+      </dgm:prSet>
+      <dgm:spPr/>
+    </dgm:pt>
+    <dgm:pt modelId="{C83C38A1-F622-4B41-891C-B4BDE13A7214}" type="pres">
+      <dgm:prSet presAssocID="{003654E0-9E18-4D5E-982E-B9794BA45E9A}" presName="quadrant3" presStyleLbl="node1" presStyleIdx="2" presStyleCnt="4">
         <dgm:presLayoutVars>
           <dgm:chMax val="1"/>
           <dgm:bulletEnabled val="1"/>
@@ -1018,87 +1285,72 @@
         </a:p>
       </dgm:t>
     </dgm:pt>
-    <dgm:pt modelId="{46CE1E5C-8939-4A36-8B37-5AAF71CAE741}" type="pres">
-      <dgm:prSet presAssocID="{7A76136E-42B0-407A-9E3C-35F577E22FEA}" presName="quadrant2" presStyleLbl="node1" presStyleIdx="1" presStyleCnt="4">
+    <dgm:pt modelId="{1A754D53-E6BA-454E-9AAD-0DF4E9D72B20}" type="pres">
+      <dgm:prSet presAssocID="{003654E0-9E18-4D5E-982E-B9794BA45E9A}" presName="quadrant4" presStyleLbl="node1" presStyleIdx="3" presStyleCnt="4">
         <dgm:presLayoutVars>
           <dgm:chMax val="1"/>
           <dgm:bulletEnabled val="1"/>
         </dgm:presLayoutVars>
       </dgm:prSet>
       <dgm:spPr/>
-      <dgm:t>
-        <a:bodyPr/>
-        <a:lstStyle/>
-        <a:p>
-          <a:endParaRPr lang="en-US"/>
-        </a:p>
-      </dgm:t>
     </dgm:pt>
-    <dgm:pt modelId="{6A6217EA-4BF7-40D3-9753-150DC7CB2EA4}" type="pres">
-      <dgm:prSet presAssocID="{7A76136E-42B0-407A-9E3C-35F577E22FEA}" presName="quadrant3" presStyleLbl="node1" presStyleIdx="2" presStyleCnt="4">
-        <dgm:presLayoutVars>
-          <dgm:chMax val="1"/>
-          <dgm:bulletEnabled val="1"/>
-        </dgm:presLayoutVars>
-      </dgm:prSet>
-      <dgm:spPr/>
-      <dgm:t>
-        <a:bodyPr/>
-        <a:lstStyle/>
-        <a:p>
-          <a:endParaRPr lang="en-US"/>
-        </a:p>
-      </dgm:t>
-    </dgm:pt>
-    <dgm:pt modelId="{3C63B109-5EB6-4072-92C7-16DDBB3944B9}" type="pres">
-      <dgm:prSet presAssocID="{7A76136E-42B0-407A-9E3C-35F577E22FEA}" presName="quadrant4" presStyleLbl="node1" presStyleIdx="3" presStyleCnt="4">
-        <dgm:presLayoutVars>
-          <dgm:chMax val="1"/>
-          <dgm:bulletEnabled val="1"/>
-        </dgm:presLayoutVars>
-      </dgm:prSet>
-      <dgm:spPr/>
-      <dgm:t>
-        <a:bodyPr/>
-        <a:lstStyle/>
-        <a:p>
-          <a:endParaRPr lang="en-US"/>
-        </a:p>
-      </dgm:t>
-    </dgm:pt>
-    <dgm:pt modelId="{E9C8B870-5A45-43B0-9CA2-8C1457F3821B}" type="pres">
-      <dgm:prSet presAssocID="{7A76136E-42B0-407A-9E3C-35F577E22FEA}" presName="quadrantPlaceholder" presStyleCnt="0"/>
+    <dgm:pt modelId="{141FA543-C0FC-4852-BEB1-60C3A3DE27B5}" type="pres">
+      <dgm:prSet presAssocID="{003654E0-9E18-4D5E-982E-B9794BA45E9A}" presName="quadrantPlaceholder" presStyleCnt="0"/>
       <dgm:spPr/>
     </dgm:pt>
-    <dgm:pt modelId="{20621A49-E063-47D5-B57E-E381CBCA2E75}" type="pres">
-      <dgm:prSet presAssocID="{7A76136E-42B0-407A-9E3C-35F577E22FEA}" presName="center1" presStyleLbl="fgShp" presStyleIdx="0" presStyleCnt="2"/>
+    <dgm:pt modelId="{6CB34AB9-3D7C-4ABE-8F2B-9283D83B5DD8}" type="pres">
+      <dgm:prSet presAssocID="{003654E0-9E18-4D5E-982E-B9794BA45E9A}" presName="center1" presStyleLbl="fgShp" presStyleIdx="0" presStyleCnt="2"/>
       <dgm:spPr/>
     </dgm:pt>
-    <dgm:pt modelId="{A8B89C89-1F26-43A0-BA04-52DA495D7E81}" type="pres">
-      <dgm:prSet presAssocID="{7A76136E-42B0-407A-9E3C-35F577E22FEA}" presName="center2" presStyleLbl="fgShp" presStyleIdx="1" presStyleCnt="2"/>
+    <dgm:pt modelId="{B6B300BC-3EB3-4430-98C1-CF956D16D11A}" type="pres">
+      <dgm:prSet presAssocID="{003654E0-9E18-4D5E-982E-B9794BA45E9A}" presName="center2" presStyleLbl="fgShp" presStyleIdx="1" presStyleCnt="2"/>
       <dgm:spPr/>
     </dgm:pt>
   </dgm:ptLst>
   <dgm:cxnLst>
-    <dgm:cxn modelId="{BC69D81C-2DB9-4A4D-8A85-132769F917A6}" type="presOf" srcId="{7A76136E-42B0-407A-9E3C-35F577E22FEA}" destId="{FA510CA3-8E9F-460B-9BB7-0697F135BCD9}" srcOrd="0" destOrd="0" presId="urn:microsoft.com/office/officeart/2005/8/layout/cycle4#13"/>
-    <dgm:cxn modelId="{95DF2159-0DE5-4C1D-8027-5420843D3080}" type="presOf" srcId="{881D9D21-7E8D-401C-A24C-C32B7AB614AA}" destId="{CF943B87-6C18-4D87-9DCC-99D0D7FC51EF}" srcOrd="0" destOrd="0" presId="urn:microsoft.com/office/officeart/2005/8/layout/cycle4#13"/>
-    <dgm:cxn modelId="{CB6DC5E4-099B-495B-95CF-24A784E80DAF}" srcId="{881D9D21-7E8D-401C-A24C-C32B7AB614AA}" destId="{A0EA9376-C593-4244-8E64-7081B7D7B8B4}" srcOrd="0" destOrd="0" parTransId="{72F46624-9447-40DD-9D16-8F702D8E4978}" sibTransId="{06B1B16B-BD96-40B7-875E-D9C3F0AC4644}"/>
-    <dgm:cxn modelId="{ACC3FC6A-2DF9-41A2-859F-93696ADC2FB6}" srcId="{7A76136E-42B0-407A-9E3C-35F577E22FEA}" destId="{881D9D21-7E8D-401C-A24C-C32B7AB614AA}" srcOrd="0" destOrd="0" parTransId="{4E9EDC70-3FFC-459B-8C26-1AAEC47C4CB8}" sibTransId="{8CC1C4E0-A0F1-4A06-8CA4-D3057A2B9C31}"/>
-    <dgm:cxn modelId="{3DD23AAC-AA0A-4657-A0DE-3EA3951A61FC}" type="presOf" srcId="{A0EA9376-C593-4244-8E64-7081B7D7B8B4}" destId="{13566014-1BCD-4D84-AF3A-9F0BAF12B41F}" srcOrd="0" destOrd="0" presId="urn:microsoft.com/office/officeart/2005/8/layout/cycle4#13"/>
-    <dgm:cxn modelId="{AEA4D70A-A715-4293-A770-86BE0354F4B2}" type="presOf" srcId="{A0EA9376-C593-4244-8E64-7081B7D7B8B4}" destId="{A734AB44-D93C-4920-B4A6-E1F058AC63EF}" srcOrd="1" destOrd="0" presId="urn:microsoft.com/office/officeart/2005/8/layout/cycle4#13"/>
-    <dgm:cxn modelId="{F84E4999-A943-4718-83C1-5E5F03EEEE82}" type="presParOf" srcId="{FA510CA3-8E9F-460B-9BB7-0697F135BCD9}" destId="{32A9AAED-5593-487B-87D4-4D7E1DF31145}" srcOrd="0" destOrd="0" presId="urn:microsoft.com/office/officeart/2005/8/layout/cycle4#13"/>
-    <dgm:cxn modelId="{FA292121-BD52-4A25-BCAF-095BC6971521}" type="presParOf" srcId="{32A9AAED-5593-487B-87D4-4D7E1DF31145}" destId="{E4A16927-20DD-43BC-9852-A49CA30E8CDB}" srcOrd="0" destOrd="0" presId="urn:microsoft.com/office/officeart/2005/8/layout/cycle4#13"/>
-    <dgm:cxn modelId="{4972681D-3958-49C7-995E-9E3024772411}" type="presParOf" srcId="{E4A16927-20DD-43BC-9852-A49CA30E8CDB}" destId="{13566014-1BCD-4D84-AF3A-9F0BAF12B41F}" srcOrd="0" destOrd="0" presId="urn:microsoft.com/office/officeart/2005/8/layout/cycle4#13"/>
-    <dgm:cxn modelId="{1C304DEF-0FF0-4819-9389-0925ECCCCAFB}" type="presParOf" srcId="{E4A16927-20DD-43BC-9852-A49CA30E8CDB}" destId="{A734AB44-D93C-4920-B4A6-E1F058AC63EF}" srcOrd="1" destOrd="0" presId="urn:microsoft.com/office/officeart/2005/8/layout/cycle4#13"/>
-    <dgm:cxn modelId="{E1F6D34E-2652-4B26-92D2-EC1B67A6BA0F}" type="presParOf" srcId="{32A9AAED-5593-487B-87D4-4D7E1DF31145}" destId="{337AB61B-3B71-48B0-ACDD-E026E0F84013}" srcOrd="1" destOrd="0" presId="urn:microsoft.com/office/officeart/2005/8/layout/cycle4#13"/>
-    <dgm:cxn modelId="{1BBFF839-481D-40B7-AE70-D9F526132211}" type="presParOf" srcId="{FA510CA3-8E9F-460B-9BB7-0697F135BCD9}" destId="{198E7E4D-3128-4553-864F-BAC5DFA3ECA2}" srcOrd="1" destOrd="0" presId="urn:microsoft.com/office/officeart/2005/8/layout/cycle4#13"/>
-    <dgm:cxn modelId="{97B36DDB-D49C-4312-AB3A-BBB600C2D000}" type="presParOf" srcId="{198E7E4D-3128-4553-864F-BAC5DFA3ECA2}" destId="{CF943B87-6C18-4D87-9DCC-99D0D7FC51EF}" srcOrd="0" destOrd="0" presId="urn:microsoft.com/office/officeart/2005/8/layout/cycle4#13"/>
-    <dgm:cxn modelId="{C82D29E2-DFB6-4C35-838F-07AB2CE0EA8E}" type="presParOf" srcId="{198E7E4D-3128-4553-864F-BAC5DFA3ECA2}" destId="{46CE1E5C-8939-4A36-8B37-5AAF71CAE741}" srcOrd="1" destOrd="0" presId="urn:microsoft.com/office/officeart/2005/8/layout/cycle4#13"/>
-    <dgm:cxn modelId="{B59AA6E0-0E47-4089-95A4-C138CBF70337}" type="presParOf" srcId="{198E7E4D-3128-4553-864F-BAC5DFA3ECA2}" destId="{6A6217EA-4BF7-40D3-9753-150DC7CB2EA4}" srcOrd="2" destOrd="0" presId="urn:microsoft.com/office/officeart/2005/8/layout/cycle4#13"/>
-    <dgm:cxn modelId="{5CDE3F22-D093-4782-9046-9FDF68B4A8F5}" type="presParOf" srcId="{198E7E4D-3128-4553-864F-BAC5DFA3ECA2}" destId="{3C63B109-5EB6-4072-92C7-16DDBB3944B9}" srcOrd="3" destOrd="0" presId="urn:microsoft.com/office/officeart/2005/8/layout/cycle4#13"/>
-    <dgm:cxn modelId="{FC3CFFE7-0593-4870-9583-B3BC5A3D1D91}" type="presParOf" srcId="{198E7E4D-3128-4553-864F-BAC5DFA3ECA2}" destId="{E9C8B870-5A45-43B0-9CA2-8C1457F3821B}" srcOrd="4" destOrd="0" presId="urn:microsoft.com/office/officeart/2005/8/layout/cycle4#13"/>
-    <dgm:cxn modelId="{0756CECD-DC4B-4EF7-A9D3-5BC28DEB579F}" type="presParOf" srcId="{FA510CA3-8E9F-460B-9BB7-0697F135BCD9}" destId="{20621A49-E063-47D5-B57E-E381CBCA2E75}" srcOrd="2" destOrd="0" presId="urn:microsoft.com/office/officeart/2005/8/layout/cycle4#13"/>
-    <dgm:cxn modelId="{BF508735-F90C-4652-A904-61C881512F80}" type="presParOf" srcId="{FA510CA3-8E9F-460B-9BB7-0697F135BCD9}" destId="{A8B89C89-1F26-43A0-BA04-52DA495D7E81}" srcOrd="3" destOrd="0" presId="urn:microsoft.com/office/officeart/2005/8/layout/cycle4#13"/>
+    <dgm:cxn modelId="{55AB6FEB-259F-4783-A4AD-9C48C7BED569}" type="presOf" srcId="{304AE478-6D78-4015-872C-96449D81B928}" destId="{560839B1-6C83-4472-81FB-A55CE4A88370}" srcOrd="1" destOrd="0" presId="urn:microsoft.com/office/officeart/2005/8/layout/cycle4"/>
+    <dgm:cxn modelId="{E2D4C9EB-EE0B-4625-968D-17652BF06CC0}" srcId="{003654E0-9E18-4D5E-982E-B9794BA45E9A}" destId="{4CCE717E-3DF3-496D-96B6-14B62FE6A965}" srcOrd="3" destOrd="0" parTransId="{4D8BCB9F-502C-4C58-8270-6CE8EEAD19EC}" sibTransId="{BFD8F682-3F4E-49DE-906B-38A5613F7665}"/>
+    <dgm:cxn modelId="{9AD95968-7506-4AF4-BCD0-5C1DFB0E5DC2}" type="presOf" srcId="{B2CCC5D8-B694-4307-90EF-DA94FDE9E13F}" destId="{6882F1B9-F3A5-4D6C-8E1C-7A2A04343C7C}" srcOrd="1" destOrd="0" presId="urn:microsoft.com/office/officeart/2005/8/layout/cycle4"/>
+    <dgm:cxn modelId="{97AD37F4-F38C-4200-8244-0F4969190F2B}" srcId="{003654E0-9E18-4D5E-982E-B9794BA45E9A}" destId="{599E7BAD-D9C8-4140-986F-65ED966AE095}" srcOrd="0" destOrd="0" parTransId="{71CF6D46-33FF-47FF-A47B-BE31BD4CC152}" sibTransId="{826A52B2-7700-4B45-B545-7B221F74AE69}"/>
+    <dgm:cxn modelId="{4D121755-B4CD-409E-83A9-D1A3901AB07E}" type="presOf" srcId="{599E7BAD-D9C8-4140-986F-65ED966AE095}" destId="{D61DF2A0-61BE-486A-9D59-BB3A3C9817A5}" srcOrd="0" destOrd="0" presId="urn:microsoft.com/office/officeart/2005/8/layout/cycle4"/>
+    <dgm:cxn modelId="{2D6BE06D-8699-4D8C-8DC9-F85784EE3E94}" srcId="{3F8B8820-33BE-41F6-8C9D-CB004C05B899}" destId="{304AE478-6D78-4015-872C-96449D81B928}" srcOrd="0" destOrd="0" parTransId="{9B61C3E6-2FD2-4BE7-8E3A-74F1B9CEF8A0}" sibTransId="{9BA2EC1C-6DD4-40CB-A0BB-CB90F7F19AD8}"/>
+    <dgm:cxn modelId="{47C50A15-ACD0-40D5-B122-55572EE79D17}" type="presOf" srcId="{C1162557-9B22-4E88-A090-5FF51D5B8295}" destId="{47FAC8C8-7BE1-4962-8E2E-D0AFDDAB8BCB}" srcOrd="0" destOrd="0" presId="urn:microsoft.com/office/officeart/2005/8/layout/cycle4"/>
+    <dgm:cxn modelId="{7D47BDCA-499F-4C58-B4BF-743D02652485}" srcId="{4CCE717E-3DF3-496D-96B6-14B62FE6A965}" destId="{B2CCC5D8-B694-4307-90EF-DA94FDE9E13F}" srcOrd="0" destOrd="0" parTransId="{48857B38-8F70-4172-BB19-54AE3B9822EB}" sibTransId="{9DE5CBD8-A66B-4661-B385-25E7B653CBBB}"/>
+    <dgm:cxn modelId="{0E77C622-9118-4185-90C2-E63244288033}" type="presOf" srcId="{B2CCC5D8-B694-4307-90EF-DA94FDE9E13F}" destId="{FD063360-877F-494F-B6E0-C669D22636DB}" srcOrd="0" destOrd="0" presId="urn:microsoft.com/office/officeart/2005/8/layout/cycle4"/>
+    <dgm:cxn modelId="{722368D6-B795-4D23-84B3-11EA621EF861}" type="presOf" srcId="{6BD59895-F20B-4F11-AAF0-4DBB9E4B09A3}" destId="{526254A8-069C-4F53-8414-9E825075309B}" srcOrd="1" destOrd="0" presId="urn:microsoft.com/office/officeart/2005/8/layout/cycle4"/>
+    <dgm:cxn modelId="{64C77EC9-CAAF-414B-9BF7-38B4BB9C5247}" type="presOf" srcId="{304AE478-6D78-4015-872C-96449D81B928}" destId="{089BF8AA-A8C8-467E-BB04-9D3FBCD354A8}" srcOrd="0" destOrd="0" presId="urn:microsoft.com/office/officeart/2005/8/layout/cycle4"/>
+    <dgm:cxn modelId="{FC975CA1-FBA4-4159-B287-0698A51A2A71}" type="presOf" srcId="{4CCE717E-3DF3-496D-96B6-14B62FE6A965}" destId="{1A754D53-E6BA-454E-9AAD-0DF4E9D72B20}" srcOrd="0" destOrd="0" presId="urn:microsoft.com/office/officeart/2005/8/layout/cycle4"/>
+    <dgm:cxn modelId="{0F329598-6CAC-4DB4-996F-27934E3F0BB8}" srcId="{003654E0-9E18-4D5E-982E-B9794BA45E9A}" destId="{C1162557-9B22-4E88-A090-5FF51D5B8295}" srcOrd="1" destOrd="0" parTransId="{2191C118-335A-49FA-89A4-87D7CCA9BE16}" sibTransId="{A9641CE4-75BE-4FAA-91B5-93BFC98D9D72}"/>
+    <dgm:cxn modelId="{3EA93CE7-9993-487E-97ED-D8FB1678C77D}" srcId="{003654E0-9E18-4D5E-982E-B9794BA45E9A}" destId="{3F8B8820-33BE-41F6-8C9D-CB004C05B899}" srcOrd="2" destOrd="0" parTransId="{01D3A64B-7D8F-4C8A-9559-CB9C2201D747}" sibTransId="{E7C6F197-2BAC-4B70-8004-D60E2FB73279}"/>
+    <dgm:cxn modelId="{13F243A1-533B-4342-8CFE-D1EE32EA4B5E}" type="presOf" srcId="{003654E0-9E18-4D5E-982E-B9794BA45E9A}" destId="{15F91B88-19C7-4EFA-8B15-292C03FBB2EF}" srcOrd="0" destOrd="0" presId="urn:microsoft.com/office/officeart/2005/8/layout/cycle4"/>
+    <dgm:cxn modelId="{601D0413-E462-47DF-A6E3-09FDAEC3359A}" type="presOf" srcId="{0724DAD8-2A69-4A1A-8F15-338B8B15E6F2}" destId="{51FCF558-D603-4FFA-9BCD-09AEF65F6FC2}" srcOrd="0" destOrd="0" presId="urn:microsoft.com/office/officeart/2005/8/layout/cycle4"/>
+    <dgm:cxn modelId="{76060151-B2A8-4433-A3A7-72E3BD32BC8A}" type="presOf" srcId="{6BD59895-F20B-4F11-AAF0-4DBB9E4B09A3}" destId="{C05466EF-19FA-453C-990A-DAAB7AC0AFD3}" srcOrd="0" destOrd="0" presId="urn:microsoft.com/office/officeart/2005/8/layout/cycle4"/>
+    <dgm:cxn modelId="{2A088761-D1CB-496D-9145-0794B8A3803F}" type="presOf" srcId="{3F8B8820-33BE-41F6-8C9D-CB004C05B899}" destId="{C83C38A1-F622-4B41-891C-B4BDE13A7214}" srcOrd="0" destOrd="0" presId="urn:microsoft.com/office/officeart/2005/8/layout/cycle4"/>
+    <dgm:cxn modelId="{458E33E6-4CAA-4C6A-B5EA-81E128FE692A}" srcId="{C1162557-9B22-4E88-A090-5FF51D5B8295}" destId="{0724DAD8-2A69-4A1A-8F15-338B8B15E6F2}" srcOrd="0" destOrd="0" parTransId="{16EF8677-2289-48A6-92BB-A7F00928933E}" sibTransId="{C39FC2A2-A0AE-4238-8780-E13778590D70}"/>
+    <dgm:cxn modelId="{A1F816E3-F8FB-4CC5-BF37-58D48E28ACB2}" type="presOf" srcId="{0724DAD8-2A69-4A1A-8F15-338B8B15E6F2}" destId="{0749C027-4B27-4B84-BFD3-16D8440F6A32}" srcOrd="1" destOrd="0" presId="urn:microsoft.com/office/officeart/2005/8/layout/cycle4"/>
+    <dgm:cxn modelId="{AF512D4B-9F3E-49E0-85E7-B842EE6BF609}" srcId="{599E7BAD-D9C8-4140-986F-65ED966AE095}" destId="{6BD59895-F20B-4F11-AAF0-4DBB9E4B09A3}" srcOrd="0" destOrd="0" parTransId="{43165439-FD40-4572-BFA2-0E332F7AC200}" sibTransId="{576F2714-2620-4DD8-A983-23EA4E9C8EAB}"/>
+    <dgm:cxn modelId="{BC163FCC-596A-4CA1-BF0F-7ABB7709263D}" type="presParOf" srcId="{15F91B88-19C7-4EFA-8B15-292C03FBB2EF}" destId="{77E2984E-B177-46C9-A01F-4DFD59131FBB}" srcOrd="0" destOrd="0" presId="urn:microsoft.com/office/officeart/2005/8/layout/cycle4"/>
+    <dgm:cxn modelId="{177DA972-11A8-4EE4-86D0-197D023416EE}" type="presParOf" srcId="{77E2984E-B177-46C9-A01F-4DFD59131FBB}" destId="{EA121366-D4D8-431F-9558-3AF41209029F}" srcOrd="0" destOrd="0" presId="urn:microsoft.com/office/officeart/2005/8/layout/cycle4"/>
+    <dgm:cxn modelId="{5A78C5F0-726B-41BD-BA2E-D0C94B1182E4}" type="presParOf" srcId="{EA121366-D4D8-431F-9558-3AF41209029F}" destId="{C05466EF-19FA-453C-990A-DAAB7AC0AFD3}" srcOrd="0" destOrd="0" presId="urn:microsoft.com/office/officeart/2005/8/layout/cycle4"/>
+    <dgm:cxn modelId="{633177B8-F1AD-4CC6-A556-53CEB14D65B2}" type="presParOf" srcId="{EA121366-D4D8-431F-9558-3AF41209029F}" destId="{526254A8-069C-4F53-8414-9E825075309B}" srcOrd="1" destOrd="0" presId="urn:microsoft.com/office/officeart/2005/8/layout/cycle4"/>
+    <dgm:cxn modelId="{91AD11C4-EAD8-476C-9EC4-1920AA1EC9C1}" type="presParOf" srcId="{77E2984E-B177-46C9-A01F-4DFD59131FBB}" destId="{1E304393-B545-4646-ACCF-B4EBD4E4E64B}" srcOrd="1" destOrd="0" presId="urn:microsoft.com/office/officeart/2005/8/layout/cycle4"/>
+    <dgm:cxn modelId="{2FD0F0DF-DE47-42F5-8238-2456B5E76E30}" type="presParOf" srcId="{1E304393-B545-4646-ACCF-B4EBD4E4E64B}" destId="{51FCF558-D603-4FFA-9BCD-09AEF65F6FC2}" srcOrd="0" destOrd="0" presId="urn:microsoft.com/office/officeart/2005/8/layout/cycle4"/>
+    <dgm:cxn modelId="{60D59E7B-61DE-41AD-9D6B-6E6876FCAB11}" type="presParOf" srcId="{1E304393-B545-4646-ACCF-B4EBD4E4E64B}" destId="{0749C027-4B27-4B84-BFD3-16D8440F6A32}" srcOrd="1" destOrd="0" presId="urn:microsoft.com/office/officeart/2005/8/layout/cycle4"/>
+    <dgm:cxn modelId="{17C6B4A7-C10B-4F0C-BE3C-F5525BE3540A}" type="presParOf" srcId="{77E2984E-B177-46C9-A01F-4DFD59131FBB}" destId="{1DC2898C-7A4C-40C0-B642-C211A7FD2C7D}" srcOrd="2" destOrd="0" presId="urn:microsoft.com/office/officeart/2005/8/layout/cycle4"/>
+    <dgm:cxn modelId="{D52BD604-9BBE-4649-B3C5-93A2DB9EF554}" type="presParOf" srcId="{1DC2898C-7A4C-40C0-B642-C211A7FD2C7D}" destId="{089BF8AA-A8C8-467E-BB04-9D3FBCD354A8}" srcOrd="0" destOrd="0" presId="urn:microsoft.com/office/officeart/2005/8/layout/cycle4"/>
+    <dgm:cxn modelId="{D90222C6-A1DA-4052-AC04-8C5456A5E7C3}" type="presParOf" srcId="{1DC2898C-7A4C-40C0-B642-C211A7FD2C7D}" destId="{560839B1-6C83-4472-81FB-A55CE4A88370}" srcOrd="1" destOrd="0" presId="urn:microsoft.com/office/officeart/2005/8/layout/cycle4"/>
+    <dgm:cxn modelId="{2DA3FBD7-AE08-42F5-9380-2F7404D31DDB}" type="presParOf" srcId="{77E2984E-B177-46C9-A01F-4DFD59131FBB}" destId="{42AD15FB-06C4-4A5B-B01A-A1E68CA56757}" srcOrd="3" destOrd="0" presId="urn:microsoft.com/office/officeart/2005/8/layout/cycle4"/>
+    <dgm:cxn modelId="{02FBBCB7-ABC7-4ED8-B8AE-1BB0E2424EB8}" type="presParOf" srcId="{42AD15FB-06C4-4A5B-B01A-A1E68CA56757}" destId="{FD063360-877F-494F-B6E0-C669D22636DB}" srcOrd="0" destOrd="0" presId="urn:microsoft.com/office/officeart/2005/8/layout/cycle4"/>
+    <dgm:cxn modelId="{BFCB9067-C889-4DF3-833C-E67D9636CD4F}" type="presParOf" srcId="{42AD15FB-06C4-4A5B-B01A-A1E68CA56757}" destId="{6882F1B9-F3A5-4D6C-8E1C-7A2A04343C7C}" srcOrd="1" destOrd="0" presId="urn:microsoft.com/office/officeart/2005/8/layout/cycle4"/>
+    <dgm:cxn modelId="{195B11D7-195A-4646-BEEC-855D8CC7EC5B}" type="presParOf" srcId="{77E2984E-B177-46C9-A01F-4DFD59131FBB}" destId="{BE2CBB36-39BC-41DE-88EB-49DECF328A8D}" srcOrd="4" destOrd="0" presId="urn:microsoft.com/office/officeart/2005/8/layout/cycle4"/>
+    <dgm:cxn modelId="{C0CDA416-F40A-49C5-814E-93CA6BB75AC3}" type="presParOf" srcId="{15F91B88-19C7-4EFA-8B15-292C03FBB2EF}" destId="{6E6C9ABC-0C5E-40D8-B9C3-D59F082FF25B}" srcOrd="1" destOrd="0" presId="urn:microsoft.com/office/officeart/2005/8/layout/cycle4"/>
+    <dgm:cxn modelId="{BE14A8AF-998E-445B-B863-6CBA54780698}" type="presParOf" srcId="{6E6C9ABC-0C5E-40D8-B9C3-D59F082FF25B}" destId="{D61DF2A0-61BE-486A-9D59-BB3A3C9817A5}" srcOrd="0" destOrd="0" presId="urn:microsoft.com/office/officeart/2005/8/layout/cycle4"/>
+    <dgm:cxn modelId="{E1BC0A7B-DB78-41CC-81C3-70A6863C6EE9}" type="presParOf" srcId="{6E6C9ABC-0C5E-40D8-B9C3-D59F082FF25B}" destId="{47FAC8C8-7BE1-4962-8E2E-D0AFDDAB8BCB}" srcOrd="1" destOrd="0" presId="urn:microsoft.com/office/officeart/2005/8/layout/cycle4"/>
+    <dgm:cxn modelId="{EAD4F50A-22C4-4B69-BC54-C15858DDCD07}" type="presParOf" srcId="{6E6C9ABC-0C5E-40D8-B9C3-D59F082FF25B}" destId="{C83C38A1-F622-4B41-891C-B4BDE13A7214}" srcOrd="2" destOrd="0" presId="urn:microsoft.com/office/officeart/2005/8/layout/cycle4"/>
+    <dgm:cxn modelId="{7BEA9219-F187-4EC0-9DA9-55F63B1D5D9C}" type="presParOf" srcId="{6E6C9ABC-0C5E-40D8-B9C3-D59F082FF25B}" destId="{1A754D53-E6BA-454E-9AAD-0DF4E9D72B20}" srcOrd="3" destOrd="0" presId="urn:microsoft.com/office/officeart/2005/8/layout/cycle4"/>
+    <dgm:cxn modelId="{1A911CEB-3D4B-410F-AD22-84B3626CEBF8}" type="presParOf" srcId="{6E6C9ABC-0C5E-40D8-B9C3-D59F082FF25B}" destId="{141FA543-C0FC-4852-BEB1-60C3A3DE27B5}" srcOrd="4" destOrd="0" presId="urn:microsoft.com/office/officeart/2005/8/layout/cycle4"/>
+    <dgm:cxn modelId="{7EC5BC32-B2F5-4428-A40B-88E3F5CBE23E}" type="presParOf" srcId="{15F91B88-19C7-4EFA-8B15-292C03FBB2EF}" destId="{6CB34AB9-3D7C-4ABE-8F2B-9283D83B5DD8}" srcOrd="2" destOrd="0" presId="urn:microsoft.com/office/officeart/2005/8/layout/cycle4"/>
+    <dgm:cxn modelId="{A26CBF1C-562F-40F7-B129-1475F9F5AC6A}" type="presParOf" srcId="{15F91B88-19C7-4EFA-8B15-292C03FBB2EF}" destId="{B6B300BC-3EB3-4430-98C1-CF956D16D11A}" srcOrd="3" destOrd="0" presId="urn:microsoft.com/office/officeart/2005/8/layout/cycle4"/>
   </dgm:cxnLst>
   <dgm:bg/>
   <dgm:whole/>
@@ -1123,7 +1375,7 @@
 </file>
 
 <file path=ppt/diagrams/layout1.xml><?xml version="1.0" encoding="utf-8"?>
-<dgm:layoutDef xmlns:dgm="http://schemas.openxmlformats.org/drawingml/2006/diagram" xmlns:a="http://schemas.openxmlformats.org/drawingml/2006/main" uniqueId="urn:microsoft.com/office/officeart/2005/8/layout/cycle4#13">
+<dgm:layoutDef xmlns:dgm="http://schemas.openxmlformats.org/drawingml/2006/diagram" xmlns:a="http://schemas.openxmlformats.org/drawingml/2006/main" uniqueId="urn:microsoft.com/office/officeart/2005/8/layout/cycle4">
   <dgm:title val=""/>
   <dgm:desc val=""/>
   <dgm:catLst>
@@ -1261,558 +1513,588 @@
       <dgm:constr type="ctrY" for="ch" forName="center2" refType="h" fact="0.525"/>
     </dgm:constrLst>
     <dgm:ruleLst/>
-    <dgm:layoutNode name="children">
-      <dgm:alg type="composite">
-        <dgm:param type="ar" val="1.3"/>
-      </dgm:alg>
-      <dgm:shape xmlns:r="http://schemas.openxmlformats.org/officeDocument/2006/relationships" r:blip="">
-        <dgm:adjLst/>
-      </dgm:shape>
-      <dgm:presOf/>
-      <dgm:constrLst>
-        <dgm:constr type="primFontSz" for="des" ptType="node" op="equ" val="65"/>
-        <dgm:constr type="w" for="ch" forName="child1group" refType="w" fact="0.38"/>
-        <dgm:constr type="h" for="ch" forName="child1group" refType="h" fact="0.32"/>
-        <dgm:constr type="t" for="ch" forName="child1group"/>
-        <dgm:constr type="l" for="ch" forName="child1group"/>
-        <dgm:constr type="w" for="ch" forName="child2group" refType="w" fact="0.38"/>
-        <dgm:constr type="h" for="ch" forName="child2group" refType="h" fact="0.32"/>
-        <dgm:constr type="t" for="ch" forName="child2group"/>
-        <dgm:constr type="r" for="ch" forName="child2group" refType="w"/>
-        <dgm:constr type="w" for="ch" forName="child3group" refType="w" fact="0.38"/>
-        <dgm:constr type="h" for="ch" forName="child3group" refType="h" fact="0.32"/>
-        <dgm:constr type="b" for="ch" forName="child3group" refType="h"/>
-        <dgm:constr type="r" for="ch" forName="child3group" refType="w"/>
-        <dgm:constr type="w" for="ch" forName="child4group" refType="w" fact="0.38"/>
-        <dgm:constr type="h" for="ch" forName="child4group" refType="h" fact="0.32"/>
-        <dgm:constr type="b" for="ch" forName="child4group" refType="h"/>
-        <dgm:constr type="l" for="ch" forName="child4group"/>
-      </dgm:constrLst>
-      <dgm:ruleLst/>
-      <dgm:choose name="Name5">
-        <dgm:if name="Name6" axis="ch ch" ptType="node node" st="1 1" cnt="1 0" func="cnt" op="gte" val="1">
-          <dgm:layoutNode name="child1group">
-            <dgm:alg type="composite">
-              <dgm:param type="horzAlign" val="none"/>
-              <dgm:param type="vertAlign" val="none"/>
-            </dgm:alg>
+    <dgm:choose name="Name0">
+      <dgm:if name="Name1" axis="ch" ptType="node" func="cnt" op="gte" val="1">
+        <dgm:layoutNode name="children">
+          <dgm:alg type="composite">
+            <dgm:param type="ar" val="1.3"/>
+          </dgm:alg>
+          <dgm:shape xmlns:r="http://schemas.openxmlformats.org/officeDocument/2006/relationships" r:blip="">
+            <dgm:adjLst/>
+          </dgm:shape>
+          <dgm:presOf/>
+          <dgm:choose name="Name2">
+            <dgm:if name="Name3" func="var" arg="dir" op="equ" val="norm">
+              <dgm:constrLst>
+                <dgm:constr type="primFontSz" for="des" ptType="node" op="equ" val="65"/>
+                <dgm:constr type="w" for="ch" forName="child1group" refType="w" fact="0.38"/>
+                <dgm:constr type="h" for="ch" forName="child1group" refType="h" fact="0.32"/>
+                <dgm:constr type="t" for="ch" forName="child1group"/>
+                <dgm:constr type="l" for="ch" forName="child1group"/>
+                <dgm:constr type="w" for="ch" forName="child2group" refType="w" fact="0.38"/>
+                <dgm:constr type="h" for="ch" forName="child2group" refType="h" fact="0.32"/>
+                <dgm:constr type="t" for="ch" forName="child2group"/>
+                <dgm:constr type="r" for="ch" forName="child2group" refType="w"/>
+                <dgm:constr type="w" for="ch" forName="child3group" refType="w" fact="0.38"/>
+                <dgm:constr type="h" for="ch" forName="child3group" refType="h" fact="0.32"/>
+                <dgm:constr type="b" for="ch" forName="child3group" refType="h"/>
+                <dgm:constr type="r" for="ch" forName="child3group" refType="w"/>
+                <dgm:constr type="w" for="ch" forName="child4group" refType="w" fact="0.38"/>
+                <dgm:constr type="h" for="ch" forName="child4group" refType="h" fact="0.32"/>
+                <dgm:constr type="b" for="ch" forName="child4group" refType="h"/>
+                <dgm:constr type="l" for="ch" forName="child4group"/>
+              </dgm:constrLst>
+            </dgm:if>
+            <dgm:else name="Name4">
+              <dgm:constrLst>
+                <dgm:constr type="primFontSz" for="des" ptType="node" op="equ" val="65"/>
+                <dgm:constr type="w" for="ch" forName="child1group" refType="w" fact="0.38"/>
+                <dgm:constr type="h" for="ch" forName="child1group" refType="h" fact="0.32"/>
+                <dgm:constr type="t" for="ch" forName="child1group"/>
+                <dgm:constr type="r" for="ch" forName="child1group" refType="w"/>
+                <dgm:constr type="w" for="ch" forName="child2group" refType="w" fact="0.38"/>
+                <dgm:constr type="h" for="ch" forName="child2group" refType="h" fact="0.32"/>
+                <dgm:constr type="t" for="ch" forName="child2group"/>
+                <dgm:constr type="l" for="ch" forName="child2group"/>
+                <dgm:constr type="w" for="ch" forName="child3group" refType="w" fact="0.38"/>
+                <dgm:constr type="h" for="ch" forName="child3group" refType="h" fact="0.32"/>
+                <dgm:constr type="b" for="ch" forName="child3group" refType="h"/>
+                <dgm:constr type="l" for="ch" forName="child3group"/>
+                <dgm:constr type="w" for="ch" forName="child4group" refType="w" fact="0.38"/>
+                <dgm:constr type="h" for="ch" forName="child4group" refType="h" fact="0.32"/>
+                <dgm:constr type="b" for="ch" forName="child4group" refType="h"/>
+                <dgm:constr type="r" for="ch" forName="child4group" refType="w"/>
+              </dgm:constrLst>
+            </dgm:else>
+          </dgm:choose>
+          <dgm:ruleLst/>
+          <dgm:choose name="Name5">
+            <dgm:if name="Name6" axis="ch ch" ptType="node node" st="1 1" cnt="1 0" func="cnt" op="gte" val="1">
+              <dgm:layoutNode name="child1group">
+                <dgm:alg type="composite">
+                  <dgm:param type="horzAlign" val="none"/>
+                  <dgm:param type="vertAlign" val="none"/>
+                </dgm:alg>
+                <dgm:shape xmlns:r="http://schemas.openxmlformats.org/officeDocument/2006/relationships" r:blip="">
+                  <dgm:adjLst/>
+                </dgm:shape>
+                <dgm:presOf/>
+                <dgm:choose name="Name7">
+                  <dgm:if name="Name8" func="var" arg="dir" op="equ" val="norm">
+                    <dgm:constrLst>
+                      <dgm:constr type="w" for="ch" forName="child1" refType="w"/>
+                      <dgm:constr type="h" for="ch" forName="child1" refType="h"/>
+                      <dgm:constr type="t" for="ch" forName="child1"/>
+                      <dgm:constr type="l" for="ch" forName="child1"/>
+                      <dgm:constr type="w" for="ch" forName="child1Text" refType="w" fact="0.7"/>
+                      <dgm:constr type="h" for="ch" forName="child1Text" refType="h" fact="0.75"/>
+                      <dgm:constr type="t" for="ch" forName="child1Text"/>
+                      <dgm:constr type="l" for="ch" forName="child1Text"/>
+                    </dgm:constrLst>
+                  </dgm:if>
+                  <dgm:else name="Name9">
+                    <dgm:constrLst>
+                      <dgm:constr type="w" for="ch" forName="child1" refType="w"/>
+                      <dgm:constr type="h" for="ch" forName="child1" refType="h"/>
+                      <dgm:constr type="t" for="ch" forName="child1"/>
+                      <dgm:constr type="r" for="ch" forName="child1" refType="w"/>
+                      <dgm:constr type="w" for="ch" forName="child1Text" refType="w" fact="0.7"/>
+                      <dgm:constr type="h" for="ch" forName="child1Text" refType="h" fact="0.75"/>
+                      <dgm:constr type="t" for="ch" forName="child1Text"/>
+                      <dgm:constr type="r" for="ch" forName="child1Text" refType="w"/>
+                    </dgm:constrLst>
+                  </dgm:else>
+                </dgm:choose>
+                <dgm:ruleLst/>
+                <dgm:layoutNode name="child1" styleLbl="bgAcc1">
+                  <dgm:alg type="sp"/>
+                  <dgm:shape xmlns:r="http://schemas.openxmlformats.org/officeDocument/2006/relationships" type="roundRect" r:blip="" zOrderOff="-2">
+                    <dgm:adjLst>
+                      <dgm:adj idx="1" val="0.1"/>
+                    </dgm:adjLst>
+                  </dgm:shape>
+                  <dgm:presOf axis="ch des" ptType="node node" st="1 1" cnt="1 0"/>
+                  <dgm:constrLst/>
+                  <dgm:ruleLst/>
+                </dgm:layoutNode>
+                <dgm:layoutNode name="child1Text" styleLbl="bgAcc1">
+                  <dgm:varLst>
+                    <dgm:bulletEnabled val="1"/>
+                  </dgm:varLst>
+                  <dgm:alg type="tx">
+                    <dgm:param type="stBulletLvl" val="1"/>
+                  </dgm:alg>
+                  <dgm:shape xmlns:r="http://schemas.openxmlformats.org/officeDocument/2006/relationships" type="roundRect" r:blip="" zOrderOff="-2" hideGeom="1">
+                    <dgm:adjLst>
+                      <dgm:adj idx="1" val="0.1"/>
+                    </dgm:adjLst>
+                  </dgm:shape>
+                  <dgm:presOf axis="ch des" ptType="node node" st="1 1" cnt="1 0"/>
+                  <dgm:constrLst>
+                    <dgm:constr type="tMarg" refType="primFontSz" fact="0.3"/>
+                    <dgm:constr type="bMarg" refType="primFontSz" fact="0.3"/>
+                    <dgm:constr type="lMarg" refType="primFontSz" fact="0.3"/>
+                    <dgm:constr type="rMarg" refType="primFontSz" fact="0.3"/>
+                  </dgm:constrLst>
+                  <dgm:ruleLst>
+                    <dgm:rule type="primFontSz" val="5" fact="NaN" max="NaN"/>
+                  </dgm:ruleLst>
+                </dgm:layoutNode>
+              </dgm:layoutNode>
+            </dgm:if>
+            <dgm:else name="Name10"/>
+          </dgm:choose>
+          <dgm:choose name="Name11">
+            <dgm:if name="Name12" axis="ch ch" ptType="node node" st="2 1" cnt="1 0" func="cnt" op="gte" val="1">
+              <dgm:layoutNode name="child2group">
+                <dgm:alg type="composite">
+                  <dgm:param type="horzAlign" val="none"/>
+                  <dgm:param type="vertAlign" val="none"/>
+                </dgm:alg>
+                <dgm:shape xmlns:r="http://schemas.openxmlformats.org/officeDocument/2006/relationships" r:blip="">
+                  <dgm:adjLst/>
+                </dgm:shape>
+                <dgm:choose name="Name13">
+                  <dgm:if name="Name14" func="var" arg="dir" op="equ" val="norm">
+                    <dgm:constrLst>
+                      <dgm:constr type="w" for="ch" forName="child2" refType="w"/>
+                      <dgm:constr type="h" for="ch" forName="child2" refType="h"/>
+                      <dgm:constr type="t" for="ch" forName="child2"/>
+                      <dgm:constr type="r" for="ch" forName="child2" refType="w"/>
+                      <dgm:constr type="w" for="ch" forName="child2Text" refType="w" fact="0.7"/>
+                      <dgm:constr type="h" for="ch" forName="child2Text" refType="h" fact="0.75"/>
+                      <dgm:constr type="t" for="ch" forName="child2Text"/>
+                      <dgm:constr type="r" for="ch" forName="child2Text" refType="w"/>
+                    </dgm:constrLst>
+                  </dgm:if>
+                  <dgm:else name="Name15">
+                    <dgm:constrLst>
+                      <dgm:constr type="w" for="ch" forName="child2" refType="w"/>
+                      <dgm:constr type="h" for="ch" forName="child2" refType="h"/>
+                      <dgm:constr type="t" for="ch" forName="child2"/>
+                      <dgm:constr type="l" for="ch" forName="child2"/>
+                      <dgm:constr type="w" for="ch" forName="child2Text" refType="w" fact="0.7"/>
+                      <dgm:constr type="h" for="ch" forName="child2Text" refType="h" fact="0.75"/>
+                      <dgm:constr type="t" for="ch" forName="child2Text"/>
+                      <dgm:constr type="l" for="ch" forName="child2Text"/>
+                    </dgm:constrLst>
+                  </dgm:else>
+                </dgm:choose>
+                <dgm:ruleLst/>
+                <dgm:layoutNode name="child2" styleLbl="bgAcc1">
+                  <dgm:alg type="sp"/>
+                  <dgm:shape xmlns:r="http://schemas.openxmlformats.org/officeDocument/2006/relationships" type="roundRect" r:blip="" zOrderOff="-2">
+                    <dgm:adjLst>
+                      <dgm:adj idx="1" val="0.1"/>
+                    </dgm:adjLst>
+                  </dgm:shape>
+                  <dgm:presOf axis="ch des" ptType="node node" st="2 1" cnt="1 0"/>
+                  <dgm:constrLst/>
+                  <dgm:ruleLst/>
+                </dgm:layoutNode>
+                <dgm:layoutNode name="child2Text" styleLbl="bgAcc1">
+                  <dgm:varLst>
+                    <dgm:bulletEnabled val="1"/>
+                  </dgm:varLst>
+                  <dgm:alg type="tx">
+                    <dgm:param type="stBulletLvl" val="1"/>
+                  </dgm:alg>
+                  <dgm:shape xmlns:r="http://schemas.openxmlformats.org/officeDocument/2006/relationships" type="roundRect" r:blip="" zOrderOff="-2" hideGeom="1">
+                    <dgm:adjLst>
+                      <dgm:adj idx="1" val="0.1"/>
+                    </dgm:adjLst>
+                  </dgm:shape>
+                  <dgm:presOf axis="ch des" ptType="node node" st="2 1" cnt="1 0"/>
+                  <dgm:constrLst>
+                    <dgm:constr type="tMarg" refType="primFontSz" fact="0.3"/>
+                    <dgm:constr type="bMarg" refType="primFontSz" fact="0.3"/>
+                    <dgm:constr type="lMarg" refType="primFontSz" fact="0.3"/>
+                    <dgm:constr type="rMarg" refType="primFontSz" fact="0.3"/>
+                  </dgm:constrLst>
+                  <dgm:ruleLst>
+                    <dgm:rule type="primFontSz" val="5" fact="NaN" max="NaN"/>
+                  </dgm:ruleLst>
+                </dgm:layoutNode>
+              </dgm:layoutNode>
+            </dgm:if>
+            <dgm:else name="Name16"/>
+          </dgm:choose>
+          <dgm:choose name="Name17">
+            <dgm:if name="Name18" axis="ch ch" ptType="node node" st="3 1" cnt="1 0" func="cnt" op="gte" val="1">
+              <dgm:layoutNode name="child3group">
+                <dgm:alg type="composite">
+                  <dgm:param type="horzAlign" val="none"/>
+                  <dgm:param type="vertAlign" val="none"/>
+                </dgm:alg>
+                <dgm:shape xmlns:r="http://schemas.openxmlformats.org/officeDocument/2006/relationships" r:blip="">
+                  <dgm:adjLst/>
+                </dgm:shape>
+                <dgm:presOf/>
+                <dgm:choose name="Name19">
+                  <dgm:if name="Name20" func="var" arg="dir" op="equ" val="norm">
+                    <dgm:constrLst>
+                      <dgm:constr type="w" for="ch" forName="child3" refType="w"/>
+                      <dgm:constr type="h" for="ch" forName="child3" refType="h"/>
+                      <dgm:constr type="b" for="ch" forName="child3" refType="h"/>
+                      <dgm:constr type="r" for="ch" forName="child3" refType="w"/>
+                      <dgm:constr type="w" for="ch" forName="child3Text" refType="w" fact="0.7"/>
+                      <dgm:constr type="h" for="ch" forName="child3Text" refType="h" fact="0.75"/>
+                      <dgm:constr type="b" for="ch" forName="child3Text" refType="h"/>
+                      <dgm:constr type="r" for="ch" forName="child3Text" refType="w"/>
+                    </dgm:constrLst>
+                  </dgm:if>
+                  <dgm:else name="Name21">
+                    <dgm:constrLst>
+                      <dgm:constr type="w" for="ch" forName="child3" refType="w"/>
+                      <dgm:constr type="h" for="ch" forName="child3" refType="h"/>
+                      <dgm:constr type="b" for="ch" forName="child3" refType="h"/>
+                      <dgm:constr type="l" for="ch" forName="child3"/>
+                      <dgm:constr type="w" for="ch" forName="child3Text" refType="w" fact="0.7"/>
+                      <dgm:constr type="h" for="ch" forName="child3Text" refType="h" fact="0.75"/>
+                      <dgm:constr type="b" for="ch" forName="child3Text" refType="h"/>
+                      <dgm:constr type="l" for="ch" forName="child3Text"/>
+                    </dgm:constrLst>
+                  </dgm:else>
+                </dgm:choose>
+                <dgm:ruleLst/>
+                <dgm:layoutNode name="child3" styleLbl="bgAcc1">
+                  <dgm:alg type="sp"/>
+                  <dgm:shape xmlns:r="http://schemas.openxmlformats.org/officeDocument/2006/relationships" type="roundRect" r:blip="" zOrderOff="-4">
+                    <dgm:adjLst>
+                      <dgm:adj idx="1" val="0.1"/>
+                    </dgm:adjLst>
+                  </dgm:shape>
+                  <dgm:presOf axis="ch des" ptType="node node" st="3 1" cnt="1 0"/>
+                  <dgm:constrLst/>
+                  <dgm:ruleLst/>
+                </dgm:layoutNode>
+                <dgm:layoutNode name="child3Text" styleLbl="bgAcc1">
+                  <dgm:varLst>
+                    <dgm:bulletEnabled val="1"/>
+                  </dgm:varLst>
+                  <dgm:alg type="tx">
+                    <dgm:param type="stBulletLvl" val="1"/>
+                  </dgm:alg>
+                  <dgm:shape xmlns:r="http://schemas.openxmlformats.org/officeDocument/2006/relationships" type="roundRect" r:blip="" zOrderOff="-4" hideGeom="1">
+                    <dgm:adjLst>
+                      <dgm:adj idx="1" val="0.1"/>
+                    </dgm:adjLst>
+                  </dgm:shape>
+                  <dgm:presOf axis="ch des" ptType="node node" st="3 1" cnt="1 0"/>
+                  <dgm:constrLst>
+                    <dgm:constr type="tMarg" refType="primFontSz" fact="0.3"/>
+                    <dgm:constr type="bMarg" refType="primFontSz" fact="0.3"/>
+                    <dgm:constr type="lMarg" refType="primFontSz" fact="0.3"/>
+                    <dgm:constr type="rMarg" refType="primFontSz" fact="0.3"/>
+                  </dgm:constrLst>
+                  <dgm:ruleLst>
+                    <dgm:rule type="primFontSz" val="5" fact="NaN" max="NaN"/>
+                  </dgm:ruleLst>
+                </dgm:layoutNode>
+              </dgm:layoutNode>
+            </dgm:if>
+            <dgm:else name="Name22"/>
+          </dgm:choose>
+          <dgm:choose name="Name23">
+            <dgm:if name="Name24" axis="ch ch" ptType="node node" st="4 1" cnt="1 0" func="cnt" op="gte" val="1">
+              <dgm:layoutNode name="child4group">
+                <dgm:alg type="composite">
+                  <dgm:param type="horzAlign" val="none"/>
+                  <dgm:param type="vertAlign" val="none"/>
+                </dgm:alg>
+                <dgm:shape xmlns:r="http://schemas.openxmlformats.org/officeDocument/2006/relationships" r:blip="">
+                  <dgm:adjLst/>
+                </dgm:shape>
+                <dgm:presOf/>
+                <dgm:choose name="Name25">
+                  <dgm:if name="Name26" func="var" arg="dir" op="equ" val="norm">
+                    <dgm:constrLst>
+                      <dgm:constr type="w" for="ch" forName="child4" refType="w"/>
+                      <dgm:constr type="h" for="ch" forName="child4" refType="h"/>
+                      <dgm:constr type="b" for="ch" forName="child4" refType="h"/>
+                      <dgm:constr type="l" for="ch" forName="child4"/>
+                      <dgm:constr type="w" for="ch" forName="child4Text" refType="w" fact="0.7"/>
+                      <dgm:constr type="h" for="ch" forName="child4Text" refType="h" fact="0.75"/>
+                      <dgm:constr type="b" for="ch" forName="child4Text" refType="h"/>
+                      <dgm:constr type="l" for="ch" forName="child4Text"/>
+                    </dgm:constrLst>
+                  </dgm:if>
+                  <dgm:else name="Name27">
+                    <dgm:constrLst>
+                      <dgm:constr type="w" for="ch" forName="child4" refType="w"/>
+                      <dgm:constr type="h" for="ch" forName="child4" refType="h"/>
+                      <dgm:constr type="b" for="ch" forName="child4" refType="h"/>
+                      <dgm:constr type="r" for="ch" forName="child4" refType="w"/>
+                      <dgm:constr type="w" for="ch" forName="child4Text" refType="w" fact="0.7"/>
+                      <dgm:constr type="h" for="ch" forName="child4Text" refType="h" fact="0.75"/>
+                      <dgm:constr type="b" for="ch" forName="child4Text" refType="h"/>
+                      <dgm:constr type="r" for="ch" forName="child4Text" refType="w"/>
+                    </dgm:constrLst>
+                  </dgm:else>
+                </dgm:choose>
+                <dgm:ruleLst/>
+                <dgm:layoutNode name="child4" styleLbl="bgAcc1">
+                  <dgm:alg type="sp"/>
+                  <dgm:shape xmlns:r="http://schemas.openxmlformats.org/officeDocument/2006/relationships" type="roundRect" r:blip="" zOrderOff="-4">
+                    <dgm:adjLst>
+                      <dgm:adj idx="1" val="0.1"/>
+                    </dgm:adjLst>
+                  </dgm:shape>
+                  <dgm:presOf axis="ch des" ptType="node node" st="4 1" cnt="1 0"/>
+                  <dgm:constrLst/>
+                  <dgm:ruleLst/>
+                </dgm:layoutNode>
+                <dgm:layoutNode name="child4Text" styleLbl="bgAcc1">
+                  <dgm:varLst>
+                    <dgm:bulletEnabled val="1"/>
+                  </dgm:varLst>
+                  <dgm:alg type="tx">
+                    <dgm:param type="stBulletLvl" val="1"/>
+                  </dgm:alg>
+                  <dgm:shape xmlns:r="http://schemas.openxmlformats.org/officeDocument/2006/relationships" type="roundRect" r:blip="" zOrderOff="-4" hideGeom="1">
+                    <dgm:adjLst>
+                      <dgm:adj idx="1" val="0.1"/>
+                    </dgm:adjLst>
+                  </dgm:shape>
+                  <dgm:presOf axis="ch des" ptType="node node" st="4 1" cnt="1 0"/>
+                  <dgm:constrLst>
+                    <dgm:constr type="tMarg" refType="primFontSz" fact="0.3"/>
+                    <dgm:constr type="bMarg" refType="primFontSz" fact="0.3"/>
+                    <dgm:constr type="lMarg" refType="primFontSz" fact="0.3"/>
+                    <dgm:constr type="rMarg" refType="primFontSz" fact="0.3"/>
+                  </dgm:constrLst>
+                  <dgm:ruleLst>
+                    <dgm:rule type="primFontSz" val="5" fact="NaN" max="NaN"/>
+                  </dgm:ruleLst>
+                </dgm:layoutNode>
+              </dgm:layoutNode>
+            </dgm:if>
+            <dgm:else name="Name28"/>
+          </dgm:choose>
+          <dgm:layoutNode name="childPlaceholder">
+            <dgm:alg type="sp"/>
             <dgm:shape xmlns:r="http://schemas.openxmlformats.org/officeDocument/2006/relationships" r:blip="">
               <dgm:adjLst/>
             </dgm:shape>
             <dgm:presOf/>
-            <dgm:choose name="Name7">
-              <dgm:if name="Name8" func="var" arg="dir" op="equ" val="norm">
-                <dgm:constrLst>
-                  <dgm:constr type="w" for="ch" forName="child1" refType="w"/>
-                  <dgm:constr type="h" for="ch" forName="child1" refType="h"/>
-                  <dgm:constr type="t" for="ch" forName="child1"/>
-                  <dgm:constr type="l" for="ch" forName="child1"/>
-                  <dgm:constr type="w" for="ch" forName="child1Text" refType="w" fact="0.7"/>
-                  <dgm:constr type="h" for="ch" forName="child1Text" refType="h" fact="0.75"/>
-                  <dgm:constr type="t" for="ch" forName="child1Text"/>
-                  <dgm:constr type="l" for="ch" forName="child1Text"/>
-                </dgm:constrLst>
+            <dgm:constrLst/>
+            <dgm:ruleLst/>
+          </dgm:layoutNode>
+        </dgm:layoutNode>
+        <dgm:layoutNode name="circle">
+          <dgm:alg type="composite">
+            <dgm:param type="ar" val="1"/>
+          </dgm:alg>
+          <dgm:shape xmlns:r="http://schemas.openxmlformats.org/officeDocument/2006/relationships" r:blip="">
+            <dgm:adjLst/>
+          </dgm:shape>
+          <dgm:presOf/>
+          <dgm:choose name="Name29">
+            <dgm:if name="Name30" func="var" arg="dir" op="equ" val="norm">
+              <dgm:constrLst>
+                <dgm:constr type="primFontSz" for="ch" ptType="node" op="equ" val="65"/>
+                <dgm:constr type="w" for="ch" forName="quadrant1" refType="w" fact="0.433"/>
+                <dgm:constr type="h" for="ch" forName="quadrant1" refType="h" fact="0.433"/>
+                <dgm:constr type="b" for="ch" forName="quadrant1" refType="h" fact="0.5"/>
+                <dgm:constr type="bOff" for="ch" forName="quadrant1" refType="h" fact="-0.01"/>
+                <dgm:constr type="r" for="ch" forName="quadrant1" refType="w" fact="0.5"/>
+                <dgm:constr type="rOff" for="ch" forName="quadrant1" refType="w" fact="-0.01"/>
+                <dgm:constr type="w" for="ch" forName="quadrant2" refType="w" fact="0.433"/>
+                <dgm:constr type="h" for="ch" forName="quadrant2" refType="h" fact="0.433"/>
+                <dgm:constr type="b" for="ch" forName="quadrant2" refType="h" fact="0.5"/>
+                <dgm:constr type="bOff" for="ch" forName="quadrant2" refType="h" fact="-0.01"/>
+                <dgm:constr type="l" for="ch" forName="quadrant2" refType="w" fact="0.5"/>
+                <dgm:constr type="lOff" for="ch" forName="quadrant2" refType="w" fact="0.01"/>
+                <dgm:constr type="w" for="ch" forName="quadrant3" refType="w" fact="0.433"/>
+                <dgm:constr type="h" for="ch" forName="quadrant3" refType="h" fact="0.433"/>
+                <dgm:constr type="t" for="ch" forName="quadrant3" refType="h" fact="0.5"/>
+                <dgm:constr type="tOff" for="ch" forName="quadrant3" refType="h" fact="0.01"/>
+                <dgm:constr type="l" for="ch" forName="quadrant3" refType="w" fact="0.5"/>
+                <dgm:constr type="lOff" for="ch" forName="quadrant3" refType="w" fact="0.01"/>
+                <dgm:constr type="w" for="ch" forName="quadrant4" refType="w" fact="0.433"/>
+                <dgm:constr type="h" for="ch" forName="quadrant4" refType="h" fact="0.433"/>
+                <dgm:constr type="t" for="ch" forName="quadrant4" refType="h" fact="0.5"/>
+                <dgm:constr type="tOff" for="ch" forName="quadrant4" refType="h" fact="0.01"/>
+                <dgm:constr type="r" for="ch" forName="quadrant4" refType="w" fact="0.5"/>
+                <dgm:constr type="rOff" for="ch" forName="quadrant4" refType="w" fact="-0.01"/>
+              </dgm:constrLst>
+            </dgm:if>
+            <dgm:else name="Name31">
+              <dgm:constrLst>
+                <dgm:constr type="primFontSz" for="ch" ptType="node" op="equ" val="65"/>
+                <dgm:constr type="w" for="ch" forName="quadrant1" refType="w" fact="0.433"/>
+                <dgm:constr type="h" for="ch" forName="quadrant1" refType="h" fact="0.433"/>
+                <dgm:constr type="b" for="ch" forName="quadrant1" refType="h" fact="0.5"/>
+                <dgm:constr type="bOff" for="ch" forName="quadrant1" refType="h" fact="-0.01"/>
+                <dgm:constr type="l" for="ch" forName="quadrant1" refType="w" fact="0.5"/>
+                <dgm:constr type="lOff" for="ch" forName="quadrant1" refType="w" fact="0.01"/>
+                <dgm:constr type="w" for="ch" forName="quadrant2" refType="w" fact="0.433"/>
+                <dgm:constr type="h" for="ch" forName="quadrant2" refType="h" fact="0.433"/>
+                <dgm:constr type="b" for="ch" forName="quadrant2" refType="h" fact="0.5"/>
+                <dgm:constr type="bOff" for="ch" forName="quadrant2" refType="h" fact="-0.01"/>
+                <dgm:constr type="r" for="ch" forName="quadrant2" refType="w" fact="0.5"/>
+                <dgm:constr type="rOff" for="ch" forName="quadrant2" refType="w" fact="-0.01"/>
+                <dgm:constr type="w" for="ch" forName="quadrant3" refType="w" fact="0.433"/>
+                <dgm:constr type="h" for="ch" forName="quadrant3" refType="h" fact="0.433"/>
+                <dgm:constr type="t" for="ch" forName="quadrant3" refType="h" fact="0.5"/>
+                <dgm:constr type="tOff" for="ch" forName="quadrant3" refType="h" fact="0.01"/>
+                <dgm:constr type="r" for="ch" forName="quadrant3" refType="w" fact="0.5"/>
+                <dgm:constr type="rOff" for="ch" forName="quadrant3" refType="w" fact="-0.01"/>
+                <dgm:constr type="w" for="ch" forName="quadrant4" refType="w" fact="0.433"/>
+                <dgm:constr type="h" for="ch" forName="quadrant4" refType="h" fact="0.433"/>
+                <dgm:constr type="t" for="ch" forName="quadrant4" refType="h" fact="0.5"/>
+                <dgm:constr type="tOff" for="ch" forName="quadrant4" refType="h" fact="0.01"/>
+                <dgm:constr type="l" for="ch" forName="quadrant4" refType="w" fact="0.5"/>
+                <dgm:constr type="lOff" for="ch" forName="quadrant4" refType="w" fact="0.01"/>
+              </dgm:constrLst>
+            </dgm:else>
+          </dgm:choose>
+          <dgm:ruleLst/>
+          <dgm:layoutNode name="quadrant1" styleLbl="node1">
+            <dgm:varLst>
+              <dgm:chMax val="1"/>
+              <dgm:bulletEnabled val="1"/>
+            </dgm:varLst>
+            <dgm:alg type="tx"/>
+            <dgm:choose name="Name32">
+              <dgm:if name="Name33" func="var" arg="dir" op="equ" val="norm">
+                <dgm:shape xmlns:r="http://schemas.openxmlformats.org/officeDocument/2006/relationships" type="pieWedge" r:blip="">
+                  <dgm:adjLst/>
+                </dgm:shape>
               </dgm:if>
-              <dgm:else name="Name9">
-                <dgm:constrLst>
-                  <dgm:constr type="w" for="ch" forName="child1" refType="w"/>
-                  <dgm:constr type="h" for="ch" forName="child1" refType="h"/>
-                  <dgm:constr type="t" for="ch" forName="child1"/>
-                  <dgm:constr type="r" for="ch" forName="child1" refType="w"/>
-                  <dgm:constr type="w" for="ch" forName="child1Text" refType="w" fact="0.7"/>
-                  <dgm:constr type="h" for="ch" forName="child1Text" refType="h" fact="0.75"/>
-                  <dgm:constr type="t" for="ch" forName="child1Text"/>
-                  <dgm:constr type="r" for="ch" forName="child1Text" refType="w"/>
-                </dgm:constrLst>
+              <dgm:else name="Name34">
+                <dgm:shape xmlns:r="http://schemas.openxmlformats.org/officeDocument/2006/relationships" rot="90" type="pieWedge" r:blip="">
+                  <dgm:adjLst/>
+                </dgm:shape>
               </dgm:else>
             </dgm:choose>
-            <dgm:ruleLst/>
-            <dgm:layoutNode name="child1" styleLbl="bgAcc1">
-              <dgm:alg type="sp"/>
-              <dgm:shape xmlns:r="http://schemas.openxmlformats.org/officeDocument/2006/relationships" type="roundRect" r:blip="" zOrderOff="-2">
-                <dgm:adjLst>
-                  <dgm:adj idx="1" val="0.1"/>
-                </dgm:adjLst>
-              </dgm:shape>
-              <dgm:presOf axis="ch des" ptType="node node" st="1 1" cnt="1 0"/>
-              <dgm:constrLst/>
-              <dgm:ruleLst/>
-            </dgm:layoutNode>
-            <dgm:layoutNode name="child1Text" styleLbl="bgAcc1">
-              <dgm:varLst>
-                <dgm:bulletEnabled val="1"/>
-              </dgm:varLst>
-              <dgm:alg type="tx">
-                <dgm:param type="stBulletLvl" val="1"/>
-              </dgm:alg>
-              <dgm:shape xmlns:r="http://schemas.openxmlformats.org/officeDocument/2006/relationships" type="roundRect" r:blip="" zOrderOff="-2" hideGeom="1">
-                <dgm:adjLst>
-                  <dgm:adj idx="1" val="0.1"/>
-                </dgm:adjLst>
-              </dgm:shape>
-              <dgm:presOf axis="ch des" ptType="node node" st="1 1" cnt="1 0"/>
-              <dgm:constrLst>
-                <dgm:constr type="tMarg" refType="primFontSz" fact="0.3"/>
-                <dgm:constr type="bMarg" refType="primFontSz" fact="0.3"/>
-                <dgm:constr type="lMarg" refType="primFontSz" fact="0.3"/>
-                <dgm:constr type="rMarg" refType="primFontSz" fact="0.3"/>
-              </dgm:constrLst>
-              <dgm:ruleLst>
-                <dgm:rule type="primFontSz" val="5" fact="NaN" max="NaN"/>
-              </dgm:ruleLst>
-            </dgm:layoutNode>
+            <dgm:presOf axis="ch" ptType="node" cnt="1"/>
+            <dgm:constrLst/>
+            <dgm:ruleLst>
+              <dgm:rule type="primFontSz" val="5" fact="NaN" max="NaN"/>
+            </dgm:ruleLst>
           </dgm:layoutNode>
-        </dgm:if>
-        <dgm:else name="Name10"/>
-      </dgm:choose>
-      <dgm:choose name="Name11">
-        <dgm:if name="Name12" axis="ch ch" ptType="node node" st="2 1" cnt="1 0" func="cnt" op="gte" val="1">
-          <dgm:layoutNode name="child2group">
-            <dgm:alg type="composite">
-              <dgm:param type="horzAlign" val="none"/>
-              <dgm:param type="vertAlign" val="none"/>
-            </dgm:alg>
-            <dgm:shape xmlns:r="http://schemas.openxmlformats.org/officeDocument/2006/relationships" r:blip="">
-              <dgm:adjLst/>
-            </dgm:shape>
-            <dgm:choose name="Name13">
-              <dgm:if name="Name14" func="var" arg="dir" op="equ" val="norm">
-                <dgm:constrLst>
-                  <dgm:constr type="w" for="ch" forName="child2" refType="w"/>
-                  <dgm:constr type="h" for="ch" forName="child2" refType="h"/>
-                  <dgm:constr type="t" for="ch" forName="child2"/>
-                  <dgm:constr type="r" for="ch" forName="child2" refType="w"/>
-                  <dgm:constr type="w" for="ch" forName="child2Text" refType="w" fact="0.7"/>
-                  <dgm:constr type="h" for="ch" forName="child2Text" refType="h" fact="0.75"/>
-                  <dgm:constr type="t" for="ch" forName="child2Text"/>
-                  <dgm:constr type="r" for="ch" forName="child2Text" refType="w"/>
-                </dgm:constrLst>
+          <dgm:layoutNode name="quadrant2" styleLbl="node1">
+            <dgm:varLst>
+              <dgm:chMax val="1"/>
+              <dgm:bulletEnabled val="1"/>
+            </dgm:varLst>
+            <dgm:alg type="tx"/>
+            <dgm:choose name="Name35">
+              <dgm:if name="Name36" func="var" arg="dir" op="equ" val="norm">
+                <dgm:shape xmlns:r="http://schemas.openxmlformats.org/officeDocument/2006/relationships" rot="90" type="pieWedge" r:blip="">
+                  <dgm:adjLst/>
+                </dgm:shape>
               </dgm:if>
-              <dgm:else name="Name15">
-                <dgm:constrLst>
-                  <dgm:constr type="w" for="ch" forName="child2" refType="w"/>
-                  <dgm:constr type="h" for="ch" forName="child2" refType="h"/>
-                  <dgm:constr type="t" for="ch" forName="child2"/>
-                  <dgm:constr type="l" for="ch" forName="child2"/>
-                  <dgm:constr type="w" for="ch" forName="child2Text" refType="w" fact="0.7"/>
-                  <dgm:constr type="h" for="ch" forName="child2Text" refType="h" fact="0.75"/>
-                  <dgm:constr type="t" for="ch" forName="child2Text"/>
-                  <dgm:constr type="l" for="ch" forName="child2Text"/>
-                </dgm:constrLst>
+              <dgm:else name="Name37">
+                <dgm:shape xmlns:r="http://schemas.openxmlformats.org/officeDocument/2006/relationships" type="pieWedge" r:blip="">
+                  <dgm:adjLst/>
+                </dgm:shape>
               </dgm:else>
             </dgm:choose>
-            <dgm:ruleLst/>
-            <dgm:layoutNode name="child2" styleLbl="bgAcc1">
-              <dgm:alg type="sp"/>
-              <dgm:shape xmlns:r="http://schemas.openxmlformats.org/officeDocument/2006/relationships" type="roundRect" r:blip="" zOrderOff="-2">
-                <dgm:adjLst>
-                  <dgm:adj idx="1" val="0.1"/>
-                </dgm:adjLst>
-              </dgm:shape>
-              <dgm:presOf axis="ch des" ptType="node node" st="2 1" cnt="1 0"/>
-              <dgm:constrLst/>
-              <dgm:ruleLst/>
-            </dgm:layoutNode>
-            <dgm:layoutNode name="child2Text" styleLbl="bgAcc1">
-              <dgm:varLst>
-                <dgm:bulletEnabled val="1"/>
-              </dgm:varLst>
-              <dgm:alg type="tx">
-                <dgm:param type="stBulletLvl" val="1"/>
-              </dgm:alg>
-              <dgm:shape xmlns:r="http://schemas.openxmlformats.org/officeDocument/2006/relationships" type="roundRect" r:blip="" zOrderOff="-2" hideGeom="1">
-                <dgm:adjLst>
-                  <dgm:adj idx="1" val="0.1"/>
-                </dgm:adjLst>
-              </dgm:shape>
-              <dgm:presOf axis="ch des" ptType="node node" st="2 1" cnt="1 0"/>
-              <dgm:constrLst>
-                <dgm:constr type="tMarg" refType="primFontSz" fact="0.3"/>
-                <dgm:constr type="bMarg" refType="primFontSz" fact="0.3"/>
-                <dgm:constr type="lMarg" refType="primFontSz" fact="0.3"/>
-                <dgm:constr type="rMarg" refType="primFontSz" fact="0.3"/>
-              </dgm:constrLst>
-              <dgm:ruleLst>
-                <dgm:rule type="primFontSz" val="5" fact="NaN" max="NaN"/>
-              </dgm:ruleLst>
-            </dgm:layoutNode>
+            <dgm:presOf axis="ch" ptType="node" st="2" cnt="1"/>
+            <dgm:constrLst/>
+            <dgm:ruleLst>
+              <dgm:rule type="primFontSz" val="5" fact="NaN" max="NaN"/>
+            </dgm:ruleLst>
           </dgm:layoutNode>
-        </dgm:if>
-        <dgm:else name="Name16"/>
-      </dgm:choose>
-      <dgm:choose name="Name17">
-        <dgm:if name="Name18" axis="ch ch" ptType="node node" st="3 1" cnt="1 0" func="cnt" op="gte" val="1">
-          <dgm:layoutNode name="child3group">
-            <dgm:alg type="composite">
-              <dgm:param type="horzAlign" val="none"/>
-              <dgm:param type="vertAlign" val="none"/>
-            </dgm:alg>
+          <dgm:layoutNode name="quadrant3" styleLbl="node1">
+            <dgm:varLst>
+              <dgm:chMax val="1"/>
+              <dgm:bulletEnabled val="1"/>
+            </dgm:varLst>
+            <dgm:alg type="tx"/>
+            <dgm:choose name="Name38">
+              <dgm:if name="Name39" func="var" arg="dir" op="equ" val="norm">
+                <dgm:shape xmlns:r="http://schemas.openxmlformats.org/officeDocument/2006/relationships" rot="180" type="pieWedge" r:blip="">
+                  <dgm:adjLst/>
+                </dgm:shape>
+              </dgm:if>
+              <dgm:else name="Name40">
+                <dgm:shape xmlns:r="http://schemas.openxmlformats.org/officeDocument/2006/relationships" rot="270" type="pieWedge" r:blip="">
+                  <dgm:adjLst/>
+                </dgm:shape>
+              </dgm:else>
+            </dgm:choose>
+            <dgm:presOf axis="ch" ptType="node" st="3" cnt="1"/>
+            <dgm:constrLst/>
+            <dgm:ruleLst>
+              <dgm:rule type="primFontSz" val="5" fact="NaN" max="NaN"/>
+            </dgm:ruleLst>
+          </dgm:layoutNode>
+          <dgm:layoutNode name="quadrant4" styleLbl="node1">
+            <dgm:varLst>
+              <dgm:chMax val="1"/>
+              <dgm:bulletEnabled val="1"/>
+            </dgm:varLst>
+            <dgm:alg type="tx"/>
+            <dgm:choose name="Name41">
+              <dgm:if name="Name42" func="var" arg="dir" op="equ" val="norm">
+                <dgm:shape xmlns:r="http://schemas.openxmlformats.org/officeDocument/2006/relationships" rot="270" type="pieWedge" r:blip="">
+                  <dgm:adjLst/>
+                </dgm:shape>
+              </dgm:if>
+              <dgm:else name="Name43">
+                <dgm:shape xmlns:r="http://schemas.openxmlformats.org/officeDocument/2006/relationships" rot="180" type="pieWedge" r:blip="">
+                  <dgm:adjLst/>
+                </dgm:shape>
+              </dgm:else>
+            </dgm:choose>
+            <dgm:presOf axis="ch" ptType="node" st="4" cnt="1"/>
+            <dgm:constrLst/>
+            <dgm:ruleLst>
+              <dgm:rule type="primFontSz" val="5" fact="NaN" max="NaN"/>
+            </dgm:ruleLst>
+          </dgm:layoutNode>
+          <dgm:layoutNode name="quadrantPlaceholder">
+            <dgm:alg type="sp"/>
             <dgm:shape xmlns:r="http://schemas.openxmlformats.org/officeDocument/2006/relationships" r:blip="">
               <dgm:adjLst/>
             </dgm:shape>
             <dgm:presOf/>
-            <dgm:choose name="Name19">
-              <dgm:if name="Name20" func="var" arg="dir" op="equ" val="norm">
-                <dgm:constrLst>
-                  <dgm:constr type="w" for="ch" forName="child3" refType="w"/>
-                  <dgm:constr type="h" for="ch" forName="child3" refType="h"/>
-                  <dgm:constr type="b" for="ch" forName="child3" refType="h"/>
-                  <dgm:constr type="r" for="ch" forName="child3" refType="w"/>
-                  <dgm:constr type="w" for="ch" forName="child3Text" refType="w" fact="0.7"/>
-                  <dgm:constr type="h" for="ch" forName="child3Text" refType="h" fact="0.75"/>
-                  <dgm:constr type="b" for="ch" forName="child3Text" refType="h"/>
-                  <dgm:constr type="r" for="ch" forName="child3Text" refType="w"/>
-                </dgm:constrLst>
-              </dgm:if>
-              <dgm:else name="Name21">
-                <dgm:constrLst>
-                  <dgm:constr type="w" for="ch" forName="child3" refType="w"/>
-                  <dgm:constr type="h" for="ch" forName="child3" refType="h"/>
-                  <dgm:constr type="b" for="ch" forName="child3" refType="h"/>
-                  <dgm:constr type="l" for="ch" forName="child3"/>
-                  <dgm:constr type="w" for="ch" forName="child3Text" refType="w" fact="0.7"/>
-                  <dgm:constr type="h" for="ch" forName="child3Text" refType="h" fact="0.75"/>
-                  <dgm:constr type="b" for="ch" forName="child3Text" refType="h"/>
-                  <dgm:constr type="l" for="ch" forName="child3Text"/>
-                </dgm:constrLst>
-              </dgm:else>
-            </dgm:choose>
+            <dgm:constrLst/>
             <dgm:ruleLst/>
-            <dgm:layoutNode name="child3" styleLbl="bgAcc1">
-              <dgm:alg type="sp"/>
-              <dgm:shape xmlns:r="http://schemas.openxmlformats.org/officeDocument/2006/relationships" type="roundRect" r:blip="" zOrderOff="-4">
-                <dgm:adjLst>
-                  <dgm:adj idx="1" val="0.1"/>
-                </dgm:adjLst>
+          </dgm:layoutNode>
+        </dgm:layoutNode>
+        <dgm:layoutNode name="center1" styleLbl="fgShp">
+          <dgm:alg type="sp"/>
+          <dgm:choose name="Name44">
+            <dgm:if name="Name45" func="var" arg="dir" op="equ" val="norm">
+              <dgm:shape xmlns:r="http://schemas.openxmlformats.org/officeDocument/2006/relationships" type="circularArrow" r:blip="" zOrderOff="16">
+                <dgm:adjLst/>
               </dgm:shape>
-              <dgm:presOf axis="ch des" ptType="node node" st="3 1" cnt="1 0"/>
-              <dgm:constrLst/>
-              <dgm:ruleLst/>
-            </dgm:layoutNode>
-            <dgm:layoutNode name="child3Text" styleLbl="bgAcc1">
-              <dgm:varLst>
-                <dgm:bulletEnabled val="1"/>
-              </dgm:varLst>
-              <dgm:alg type="tx">
-                <dgm:param type="stBulletLvl" val="1"/>
-              </dgm:alg>
-              <dgm:shape xmlns:r="http://schemas.openxmlformats.org/officeDocument/2006/relationships" type="roundRect" r:blip="" zOrderOff="-4" hideGeom="1">
-                <dgm:adjLst>
-                  <dgm:adj idx="1" val="0.1"/>
-                </dgm:adjLst>
+            </dgm:if>
+            <dgm:else name="Name46">
+              <dgm:shape xmlns:r="http://schemas.openxmlformats.org/officeDocument/2006/relationships" rot="180" type="leftCircularArrow" r:blip="" zOrderOff="16">
+                <dgm:adjLst/>
               </dgm:shape>
-              <dgm:presOf axis="ch des" ptType="node node" st="3 1" cnt="1 0"/>
-              <dgm:constrLst>
-                <dgm:constr type="tMarg" refType="primFontSz" fact="0.3"/>
-                <dgm:constr type="bMarg" refType="primFontSz" fact="0.3"/>
-                <dgm:constr type="lMarg" refType="primFontSz" fact="0.3"/>
-                <dgm:constr type="rMarg" refType="primFontSz" fact="0.3"/>
-              </dgm:constrLst>
-              <dgm:ruleLst>
-                <dgm:rule type="primFontSz" val="5" fact="NaN" max="NaN"/>
-              </dgm:ruleLst>
-            </dgm:layoutNode>
-          </dgm:layoutNode>
-        </dgm:if>
-        <dgm:else name="Name22"/>
-      </dgm:choose>
-      <dgm:choose name="Name23">
-        <dgm:if name="Name24" axis="ch ch" ptType="node node" st="4 1" cnt="1 0" func="cnt" op="gte" val="1">
-          <dgm:layoutNode name="child4group">
-            <dgm:alg type="composite">
-              <dgm:param type="horzAlign" val="none"/>
-              <dgm:param type="vertAlign" val="none"/>
-            </dgm:alg>
-            <dgm:shape xmlns:r="http://schemas.openxmlformats.org/officeDocument/2006/relationships" r:blip="">
-              <dgm:adjLst/>
-            </dgm:shape>
-            <dgm:presOf/>
-            <dgm:choose name="Name25">
-              <dgm:if name="Name26" func="var" arg="dir" op="equ" val="norm">
-                <dgm:constrLst>
-                  <dgm:constr type="w" for="ch" forName="child4" refType="w"/>
-                  <dgm:constr type="h" for="ch" forName="child4" refType="h"/>
-                  <dgm:constr type="b" for="ch" forName="child4" refType="h"/>
-                  <dgm:constr type="l" for="ch" forName="child4"/>
-                  <dgm:constr type="w" for="ch" forName="child4Text" refType="w" fact="0.7"/>
-                  <dgm:constr type="h" for="ch" forName="child4Text" refType="h" fact="0.75"/>
-                  <dgm:constr type="b" for="ch" forName="child4Text" refType="h"/>
-                  <dgm:constr type="l" for="ch" forName="child4Text"/>
-                </dgm:constrLst>
-              </dgm:if>
-              <dgm:else name="Name27">
-                <dgm:constrLst>
-                  <dgm:constr type="w" for="ch" forName="child4" refType="w"/>
-                  <dgm:constr type="h" for="ch" forName="child4" refType="h"/>
-                  <dgm:constr type="b" for="ch" forName="child4" refType="h"/>
-                  <dgm:constr type="r" for="ch" forName="child4" refType="w"/>
-                  <dgm:constr type="w" for="ch" forName="child4Text" refType="w" fact="0.7"/>
-                  <dgm:constr type="h" for="ch" forName="child4Text" refType="h" fact="0.75"/>
-                  <dgm:constr type="b" for="ch" forName="child4Text" refType="h"/>
-                  <dgm:constr type="r" for="ch" forName="child4Text" refType="w"/>
-                </dgm:constrLst>
-              </dgm:else>
-            </dgm:choose>
-            <dgm:ruleLst/>
-            <dgm:layoutNode name="child4" styleLbl="bgAcc1">
-              <dgm:alg type="sp"/>
-              <dgm:shape xmlns:r="http://schemas.openxmlformats.org/officeDocument/2006/relationships" type="roundRect" r:blip="" zOrderOff="-4">
-                <dgm:adjLst>
-                  <dgm:adj idx="1" val="0.1"/>
-                </dgm:adjLst>
+            </dgm:else>
+          </dgm:choose>
+          <dgm:presOf/>
+          <dgm:constrLst/>
+          <dgm:ruleLst/>
+        </dgm:layoutNode>
+        <dgm:layoutNode name="center2" styleLbl="fgShp">
+          <dgm:alg type="sp"/>
+          <dgm:choose name="Name47">
+            <dgm:if name="Name48" func="var" arg="dir" op="equ" val="norm">
+              <dgm:shape xmlns:r="http://schemas.openxmlformats.org/officeDocument/2006/relationships" rot="180" type="circularArrow" r:blip="" zOrderOff="16">
+                <dgm:adjLst/>
               </dgm:shape>
-              <dgm:presOf axis="ch des" ptType="node node" st="4 1" cnt="1 0"/>
-              <dgm:constrLst/>
-              <dgm:ruleLst/>
-            </dgm:layoutNode>
-            <dgm:layoutNode name="child4Text" styleLbl="bgAcc1">
-              <dgm:varLst>
-                <dgm:bulletEnabled val="1"/>
-              </dgm:varLst>
-              <dgm:alg type="tx">
-                <dgm:param type="stBulletLvl" val="1"/>
-              </dgm:alg>
-              <dgm:shape xmlns:r="http://schemas.openxmlformats.org/officeDocument/2006/relationships" type="roundRect" r:blip="" zOrderOff="-4" hideGeom="1">
-                <dgm:adjLst>
-                  <dgm:adj idx="1" val="0.1"/>
-                </dgm:adjLst>
+            </dgm:if>
+            <dgm:else name="Name49">
+              <dgm:shape xmlns:r="http://schemas.openxmlformats.org/officeDocument/2006/relationships" type="leftCircularArrow" r:blip="" zOrderOff="16">
+                <dgm:adjLst/>
               </dgm:shape>
-              <dgm:presOf axis="ch des" ptType="node node" st="4 1" cnt="1 0"/>
-              <dgm:constrLst>
-                <dgm:constr type="tMarg" refType="primFontSz" fact="0.3"/>
-                <dgm:constr type="bMarg" refType="primFontSz" fact="0.3"/>
-                <dgm:constr type="lMarg" refType="primFontSz" fact="0.3"/>
-                <dgm:constr type="rMarg" refType="primFontSz" fact="0.3"/>
-              </dgm:constrLst>
-              <dgm:ruleLst>
-                <dgm:rule type="primFontSz" val="5" fact="NaN" max="NaN"/>
-              </dgm:ruleLst>
-            </dgm:layoutNode>
-          </dgm:layoutNode>
-        </dgm:if>
-        <dgm:else name="Name28"/>
-      </dgm:choose>
-      <dgm:layoutNode name="childPlaceholder">
-        <dgm:alg type="sp"/>
-        <dgm:shape xmlns:r="http://schemas.openxmlformats.org/officeDocument/2006/relationships" r:blip="">
-          <dgm:adjLst/>
-        </dgm:shape>
-        <dgm:presOf/>
-        <dgm:constrLst/>
-        <dgm:ruleLst/>
-      </dgm:layoutNode>
-    </dgm:layoutNode>
-    <dgm:layoutNode name="circle">
-      <dgm:alg type="composite">
-        <dgm:param type="ar" val="1"/>
-      </dgm:alg>
-      <dgm:shape xmlns:r="http://schemas.openxmlformats.org/officeDocument/2006/relationships" r:blip="">
-        <dgm:adjLst/>
-      </dgm:shape>
-      <dgm:presOf/>
-      <dgm:choose name="Name29">
-        <dgm:if name="Name30" func="var" arg="dir" op="equ" val="norm">
-          <dgm:constrLst>
-            <dgm:constr type="primFontSz" for="ch" ptType="node" op="equ" val="65"/>
-            <dgm:constr type="w" for="ch" forName="quadrant1" refType="w" fact="0.433"/>
-            <dgm:constr type="h" for="ch" forName="quadrant1" refType="h" fact="0.433"/>
-            <dgm:constr type="b" for="ch" forName="quadrant1" refType="h" fact="0.5"/>
-            <dgm:constr type="bOff" for="ch" forName="quadrant1" refType="h" fact="-0.01"/>
-            <dgm:constr type="r" for="ch" forName="quadrant1" refType="w" fact="0.5"/>
-            <dgm:constr type="rOff" for="ch" forName="quadrant1" refType="w" fact="-0.01"/>
-            <dgm:constr type="w" for="ch" forName="quadrant2" refType="w" fact="0.433"/>
-            <dgm:constr type="h" for="ch" forName="quadrant2" refType="h" fact="0.433"/>
-            <dgm:constr type="b" for="ch" forName="quadrant2" refType="h" fact="0.5"/>
-            <dgm:constr type="bOff" for="ch" forName="quadrant2" refType="h" fact="-0.01"/>
-            <dgm:constr type="l" for="ch" forName="quadrant2" refType="w" fact="0.5"/>
-            <dgm:constr type="lOff" for="ch" forName="quadrant2" refType="w" fact="0.01"/>
-            <dgm:constr type="w" for="ch" forName="quadrant3" refType="w" fact="0.433"/>
-            <dgm:constr type="h" for="ch" forName="quadrant3" refType="h" fact="0.433"/>
-            <dgm:constr type="t" for="ch" forName="quadrant3" refType="h" fact="0.5"/>
-            <dgm:constr type="tOff" for="ch" forName="quadrant3" refType="h" fact="0.01"/>
-            <dgm:constr type="l" for="ch" forName="quadrant3" refType="w" fact="0.5"/>
-            <dgm:constr type="lOff" for="ch" forName="quadrant3" refType="w" fact="0.01"/>
-            <dgm:constr type="w" for="ch" forName="quadrant4" refType="w" fact="0.433"/>
-            <dgm:constr type="h" for="ch" forName="quadrant4" refType="h" fact="0.433"/>
-            <dgm:constr type="t" for="ch" forName="quadrant4" refType="h" fact="0.5"/>
-            <dgm:constr type="tOff" for="ch" forName="quadrant4" refType="h" fact="0.01"/>
-            <dgm:constr type="r" for="ch" forName="quadrant4" refType="w" fact="0.5"/>
-            <dgm:constr type="rOff" for="ch" forName="quadrant4" refType="w" fact="-0.01"/>
-          </dgm:constrLst>
-        </dgm:if>
-        <dgm:else name="Name31">
-          <dgm:constrLst>
-            <dgm:constr type="primFontSz" for="ch" ptType="node" op="equ" val="65"/>
-            <dgm:constr type="w" for="ch" forName="quadrant1" refType="w" fact="0.433"/>
-            <dgm:constr type="h" for="ch" forName="quadrant1" refType="h" fact="0.433"/>
-            <dgm:constr type="b" for="ch" forName="quadrant1" refType="h" fact="0.5"/>
-            <dgm:constr type="bOff" for="ch" forName="quadrant1" refType="h" fact="-0.01"/>
-            <dgm:constr type="l" for="ch" forName="quadrant1" refType="w" fact="0.5"/>
-            <dgm:constr type="lOff" for="ch" forName="quadrant1" refType="w" fact="0.01"/>
-            <dgm:constr type="w" for="ch" forName="quadrant2" refType="w" fact="0.433"/>
-            <dgm:constr type="h" for="ch" forName="quadrant2" refType="h" fact="0.433"/>
-            <dgm:constr type="b" for="ch" forName="quadrant2" refType="h" fact="0.5"/>
-            <dgm:constr type="bOff" for="ch" forName="quadrant2" refType="h" fact="-0.01"/>
-            <dgm:constr type="r" for="ch" forName="quadrant2" refType="w" fact="0.5"/>
-            <dgm:constr type="rOff" for="ch" forName="quadrant2" refType="w" fact="-0.01"/>
-            <dgm:constr type="w" for="ch" forName="quadrant3" refType="w" fact="0.433"/>
-            <dgm:constr type="h" for="ch" forName="quadrant3" refType="h" fact="0.433"/>
-            <dgm:constr type="t" for="ch" forName="quadrant3" refType="h" fact="0.5"/>
-            <dgm:constr type="tOff" for="ch" forName="quadrant3" refType="h" fact="0.01"/>
-            <dgm:constr type="r" for="ch" forName="quadrant3" refType="w" fact="0.5"/>
-            <dgm:constr type="rOff" for="ch" forName="quadrant3" refType="w" fact="-0.01"/>
-            <dgm:constr type="w" for="ch" forName="quadrant4" refType="w" fact="0.433"/>
-            <dgm:constr type="h" for="ch" forName="quadrant4" refType="h" fact="0.433"/>
-            <dgm:constr type="t" for="ch" forName="quadrant4" refType="h" fact="0.5"/>
-            <dgm:constr type="tOff" for="ch" forName="quadrant4" refType="h" fact="0.01"/>
-            <dgm:constr type="l" for="ch" forName="quadrant4" refType="w" fact="0.5"/>
-            <dgm:constr type="lOff" for="ch" forName="quadrant4" refType="w" fact="0.01"/>
-          </dgm:constrLst>
-        </dgm:else>
-      </dgm:choose>
-      <dgm:ruleLst/>
-      <dgm:layoutNode name="quadrant1" styleLbl="node1">
-        <dgm:varLst>
-          <dgm:chMax val="1"/>
-          <dgm:bulletEnabled val="1"/>
-        </dgm:varLst>
-        <dgm:alg type="tx"/>
-        <dgm:choose name="Name32">
-          <dgm:if name="Name33" func="var" arg="dir" op="equ" val="norm">
-            <dgm:shape xmlns:r="http://schemas.openxmlformats.org/officeDocument/2006/relationships" type="pieWedge" r:blip="">
-              <dgm:adjLst/>
-            </dgm:shape>
-          </dgm:if>
-          <dgm:else name="Name34">
-            <dgm:shape xmlns:r="http://schemas.openxmlformats.org/officeDocument/2006/relationships" rot="90" type="pieWedge" r:blip="">
-              <dgm:adjLst/>
-            </dgm:shape>
-          </dgm:else>
-        </dgm:choose>
-        <dgm:presOf axis="ch" ptType="node" cnt="1"/>
-        <dgm:constrLst/>
-        <dgm:ruleLst>
-          <dgm:rule type="primFontSz" val="5" fact="NaN" max="NaN"/>
-        </dgm:ruleLst>
-      </dgm:layoutNode>
-      <dgm:layoutNode name="quadrant2" styleLbl="node1">
-        <dgm:varLst>
-          <dgm:chMax val="1"/>
-          <dgm:bulletEnabled val="1"/>
-        </dgm:varLst>
-        <dgm:alg type="tx"/>
-        <dgm:choose name="Name35">
-          <dgm:if name="Name36" func="var" arg="dir" op="equ" val="norm">
-            <dgm:shape xmlns:r="http://schemas.openxmlformats.org/officeDocument/2006/relationships" rot="90" type="pieWedge" r:blip="">
-              <dgm:adjLst/>
-            </dgm:shape>
-          </dgm:if>
-          <dgm:else name="Name37">
-            <dgm:shape xmlns:r="http://schemas.openxmlformats.org/officeDocument/2006/relationships" type="pieWedge" r:blip="">
-              <dgm:adjLst/>
-            </dgm:shape>
-          </dgm:else>
-        </dgm:choose>
-        <dgm:presOf axis="ch" ptType="node" st="2" cnt="1"/>
-        <dgm:constrLst/>
-        <dgm:ruleLst>
-          <dgm:rule type="primFontSz" val="5" fact="NaN" max="NaN"/>
-        </dgm:ruleLst>
-      </dgm:layoutNode>
-      <dgm:layoutNode name="quadrant3" styleLbl="node1">
-        <dgm:varLst>
-          <dgm:chMax val="1"/>
-          <dgm:bulletEnabled val="1"/>
-        </dgm:varLst>
-        <dgm:alg type="tx"/>
-        <dgm:choose name="Name38">
-          <dgm:if name="Name39" func="var" arg="dir" op="equ" val="norm">
-            <dgm:shape xmlns:r="http://schemas.openxmlformats.org/officeDocument/2006/relationships" rot="180" type="pieWedge" r:blip="">
-              <dgm:adjLst/>
-            </dgm:shape>
-          </dgm:if>
-          <dgm:else name="Name40">
-            <dgm:shape xmlns:r="http://schemas.openxmlformats.org/officeDocument/2006/relationships" rot="270" type="pieWedge" r:blip="">
-              <dgm:adjLst/>
-            </dgm:shape>
-          </dgm:else>
-        </dgm:choose>
-        <dgm:presOf axis="ch" ptType="node" st="3" cnt="1"/>
-        <dgm:constrLst/>
-        <dgm:ruleLst>
-          <dgm:rule type="primFontSz" val="5" fact="NaN" max="NaN"/>
-        </dgm:ruleLst>
-      </dgm:layoutNode>
-      <dgm:layoutNode name="quadrant4" styleLbl="node1">
-        <dgm:varLst>
-          <dgm:chMax val="1"/>
-          <dgm:bulletEnabled val="1"/>
-        </dgm:varLst>
-        <dgm:alg type="tx"/>
-        <dgm:choose name="Name41">
-          <dgm:if name="Name42" func="var" arg="dir" op="equ" val="norm">
-            <dgm:shape xmlns:r="http://schemas.openxmlformats.org/officeDocument/2006/relationships" rot="270" type="pieWedge" r:blip="">
-              <dgm:adjLst/>
-            </dgm:shape>
-          </dgm:if>
-          <dgm:else name="Name43">
-            <dgm:shape xmlns:r="http://schemas.openxmlformats.org/officeDocument/2006/relationships" rot="180" type="pieWedge" r:blip="">
-              <dgm:adjLst/>
-            </dgm:shape>
-          </dgm:else>
-        </dgm:choose>
-        <dgm:presOf axis="ch" ptType="node" st="4" cnt="1"/>
-        <dgm:constrLst/>
-        <dgm:ruleLst>
-          <dgm:rule type="primFontSz" val="5" fact="NaN" max="NaN"/>
-        </dgm:ruleLst>
-      </dgm:layoutNode>
-      <dgm:layoutNode name="quadrantPlaceholder">
-        <dgm:alg type="sp"/>
-        <dgm:shape xmlns:r="http://schemas.openxmlformats.org/officeDocument/2006/relationships" r:blip="">
-          <dgm:adjLst/>
-        </dgm:shape>
-        <dgm:presOf/>
-        <dgm:constrLst/>
-        <dgm:ruleLst/>
-      </dgm:layoutNode>
-    </dgm:layoutNode>
-    <dgm:layoutNode name="center1" styleLbl="fgShp">
-      <dgm:alg type="sp"/>
-      <dgm:choose name="Name44">
-        <dgm:if name="Name45" func="var" arg="dir" op="equ" val="norm">
-          <dgm:shape xmlns:r="http://schemas.openxmlformats.org/officeDocument/2006/relationships" type="circularArrow" r:blip="" zOrderOff="16">
-            <dgm:adjLst/>
-          </dgm:shape>
-        </dgm:if>
-        <dgm:else name="Name46">
-          <dgm:shape xmlns:r="http://schemas.openxmlformats.org/officeDocument/2006/relationships" rot="180" type="leftCircularArrow" r:blip="" zOrderOff="16">
-            <dgm:adjLst/>
-          </dgm:shape>
-        </dgm:else>
-      </dgm:choose>
-      <dgm:presOf/>
-      <dgm:constrLst/>
-      <dgm:ruleLst/>
-    </dgm:layoutNode>
-    <dgm:layoutNode name="center2" styleLbl="fgShp">
-      <dgm:alg type="sp"/>
-      <dgm:choose name="Name47">
-        <dgm:if name="Name48" func="var" arg="dir" op="equ" val="norm">
-          <dgm:shape xmlns:r="http://schemas.openxmlformats.org/officeDocument/2006/relationships" rot="180" type="circularArrow" r:blip="" zOrderOff="16">
-            <dgm:adjLst/>
-          </dgm:shape>
-        </dgm:if>
-        <dgm:else name="Name49">
-          <dgm:shape xmlns:r="http://schemas.openxmlformats.org/officeDocument/2006/relationships" type="leftCircularArrow" r:blip="" zOrderOff="16">
-            <dgm:adjLst/>
-          </dgm:shape>
-        </dgm:else>
-      </dgm:choose>
-      <dgm:presOf/>
-      <dgm:constrLst/>
-      <dgm:ruleLst/>
-    </dgm:layoutNode>
+            </dgm:else>
+          </dgm:choose>
+          <dgm:presOf/>
+          <dgm:constrLst/>
+          <dgm:ruleLst/>
+        </dgm:layoutNode>
+      </dgm:if>
+      <dgm:else name="Name50"/>
+    </dgm:choose>
   </dgm:layoutNode>
 </dgm:layoutDef>
 </file>
@@ -5846,7 +6128,7 @@
           <p:nvPr>
             <p:extLst>
               <p:ext uri="{D42A27DB-BD31-4B8C-83A1-F6EECF244321}">
-                <p14:modId xmlns:p14="http://schemas.microsoft.com/office/powerpoint/2010/main" val="4123703018"/>
+                <p14:modId xmlns:p14="http://schemas.microsoft.com/office/powerpoint/2010/main" val="3430242285"/>
               </p:ext>
             </p:extLst>
           </p:nvPr>

</xml_diff>

<commit_message>
oox smartart, cycle matrix: handle destination order in connections
It is possible to have connections from multiple data nodes to the same
presentation node with a presOf type. We use to order these based on as
they appear in the data XML, but we need to order them according to the
destOrd attribute.

Introduce an std::map for that, so get ordering automatically as we
iterate. Turn the std::pair into a struct to make the code a bit more
readable.

Change-Id: I3d2bb047ed3f171a194851f89151bd94071a8176
Reviewed-on: https://gerrit.libreoffice.org/68027
Reviewed-by: Miklos Vajna <vmiklos@collabora.com>
Tested-by: Jenkins
</commit_message>
<xml_diff>
--- a/sd/qa/unit/data/pptx/smartart-cycle-matrix.pptx
+++ b/sd/qa/unit/data/pptx/smartart-cycle-matrix.pptx
@@ -1062,7 +1062,7 @@
         <a:p>
           <a:r>
             <a:rPr lang="en-US" dirty="0" smtClean="0"/>
-            <a:t>C2</a:t>
+            <a:t>C2-1</a:t>
           </a:r>
           <a:endParaRPr lang="en-US" dirty="0"/>
         </a:p>
@@ -1164,6 +1164,117 @@
         </a:p>
       </dgm:t>
     </dgm:pt>
+    <dgm:pt modelId="{DEAA4E0D-C8B5-4B30-8A24-B7699BC7060A}">
+      <dgm:prSet phldrT="[Text]"/>
+      <dgm:spPr/>
+      <dgm:t>
+        <a:bodyPr/>
+        <a:lstStyle/>
+        <a:p>
+          <a:r>
+            <a:rPr lang="en-US" dirty="0" smtClean="0"/>
+            <a:t>C2-2</a:t>
+          </a:r>
+          <a:endParaRPr lang="en-US" dirty="0"/>
+        </a:p>
+      </dgm:t>
+    </dgm:pt>
+    <dgm:pt modelId="{E2A376A5-DEEB-4719-B67C-5AA0AF71381F}" type="parTrans" cxnId="{48A24EC3-613C-495D-9246-A6F0D7D9950E}">
+      <dgm:prSet/>
+      <dgm:spPr/>
+      <dgm:t>
+        <a:bodyPr/>
+        <a:lstStyle/>
+        <a:p>
+          <a:endParaRPr lang="en-US"/>
+        </a:p>
+      </dgm:t>
+    </dgm:pt>
+    <dgm:pt modelId="{A4408E63-3784-45E3-9BED-DDF87BDAB338}" type="sibTrans" cxnId="{48A24EC3-613C-495D-9246-A6F0D7D9950E}">
+      <dgm:prSet/>
+      <dgm:spPr/>
+      <dgm:t>
+        <a:bodyPr/>
+        <a:lstStyle/>
+        <a:p>
+          <a:endParaRPr lang="en-US"/>
+        </a:p>
+      </dgm:t>
+    </dgm:pt>
+    <dgm:pt modelId="{2D441F45-7599-437B-9442-76606D6649FF}">
+      <dgm:prSet phldrT="[Text]"/>
+      <dgm:spPr/>
+      <dgm:t>
+        <a:bodyPr/>
+        <a:lstStyle/>
+        <a:p>
+          <a:r>
+            <a:rPr lang="en-US" dirty="0" smtClean="0"/>
+            <a:t>C2-3</a:t>
+          </a:r>
+          <a:endParaRPr lang="en-US" dirty="0"/>
+        </a:p>
+      </dgm:t>
+    </dgm:pt>
+    <dgm:pt modelId="{B8E78C7C-7573-44A9-BF7F-EDF3AF38CA63}" type="parTrans" cxnId="{D33198E3-24C6-403A-9942-AFA9AA6F2642}">
+      <dgm:prSet/>
+      <dgm:spPr/>
+      <dgm:t>
+        <a:bodyPr/>
+        <a:lstStyle/>
+        <a:p>
+          <a:endParaRPr lang="en-US"/>
+        </a:p>
+      </dgm:t>
+    </dgm:pt>
+    <dgm:pt modelId="{FF5D76AD-0625-4B5F-B851-5B4644CD56C1}" type="sibTrans" cxnId="{D33198E3-24C6-403A-9942-AFA9AA6F2642}">
+      <dgm:prSet/>
+      <dgm:spPr/>
+      <dgm:t>
+        <a:bodyPr/>
+        <a:lstStyle/>
+        <a:p>
+          <a:endParaRPr lang="en-US"/>
+        </a:p>
+      </dgm:t>
+    </dgm:pt>
+    <dgm:pt modelId="{B0495E2F-C358-46B1-8AA5-E8E1AD53C78A}">
+      <dgm:prSet phldrT="[Text]"/>
+      <dgm:spPr/>
+      <dgm:t>
+        <a:bodyPr/>
+        <a:lstStyle/>
+        <a:p>
+          <a:r>
+            <a:rPr lang="en-US" dirty="0" smtClean="0"/>
+            <a:t>C2-4</a:t>
+          </a:r>
+          <a:endParaRPr lang="en-US" dirty="0"/>
+        </a:p>
+      </dgm:t>
+    </dgm:pt>
+    <dgm:pt modelId="{F9D7900B-D534-43BD-9D97-DC822C9BB6D7}" type="parTrans" cxnId="{0131F829-9C6E-4F01-99E1-5C1E26CEB42E}">
+      <dgm:prSet/>
+      <dgm:spPr/>
+      <dgm:t>
+        <a:bodyPr/>
+        <a:lstStyle/>
+        <a:p>
+          <a:endParaRPr lang="en-US"/>
+        </a:p>
+      </dgm:t>
+    </dgm:pt>
+    <dgm:pt modelId="{E9978469-DA08-469D-8E34-3783AFD57E56}" type="sibTrans" cxnId="{0131F829-9C6E-4F01-99E1-5C1E26CEB42E}">
+      <dgm:prSet/>
+      <dgm:spPr/>
+      <dgm:t>
+        <a:bodyPr/>
+        <a:lstStyle/>
+        <a:p>
+          <a:endParaRPr lang="en-US"/>
+        </a:p>
+      </dgm:t>
+    </dgm:pt>
     <dgm:pt modelId="{15F91B88-19C7-4EFA-8B15-292C03FBB2EF}" type="pres">
       <dgm:prSet presAssocID="{003654E0-9E18-4D5E-982E-B9794BA45E9A}" presName="cycleMatrixDiagram" presStyleCnt="0">
         <dgm:presLayoutVars>
@@ -1174,6 +1285,13 @@
         </dgm:presLayoutVars>
       </dgm:prSet>
       <dgm:spPr/>
+      <dgm:t>
+        <a:bodyPr/>
+        <a:lstStyle/>
+        <a:p>
+          <a:endParaRPr lang="en-US"/>
+        </a:p>
+      </dgm:t>
     </dgm:pt>
     <dgm:pt modelId="{77E2984E-B177-46C9-A01F-4DFD59131FBB}" type="pres">
       <dgm:prSet presAssocID="{003654E0-9E18-4D5E-982E-B9794BA45E9A}" presName="children" presStyleCnt="0"/>
@@ -1186,6 +1304,13 @@
     <dgm:pt modelId="{C05466EF-19FA-453C-990A-DAAB7AC0AFD3}" type="pres">
       <dgm:prSet presAssocID="{003654E0-9E18-4D5E-982E-B9794BA45E9A}" presName="child1" presStyleLbl="bgAcc1" presStyleIdx="0" presStyleCnt="4"/>
       <dgm:spPr/>
+      <dgm:t>
+        <a:bodyPr/>
+        <a:lstStyle/>
+        <a:p>
+          <a:endParaRPr lang="en-US"/>
+        </a:p>
+      </dgm:t>
     </dgm:pt>
     <dgm:pt modelId="{526254A8-069C-4F53-8414-9E825075309B}" type="pres">
       <dgm:prSet presAssocID="{003654E0-9E18-4D5E-982E-B9794BA45E9A}" presName="child1Text" presStyleLbl="bgAcc1" presStyleIdx="0" presStyleCnt="4">
@@ -1194,6 +1319,13 @@
         </dgm:presLayoutVars>
       </dgm:prSet>
       <dgm:spPr/>
+      <dgm:t>
+        <a:bodyPr/>
+        <a:lstStyle/>
+        <a:p>
+          <a:endParaRPr lang="en-US"/>
+        </a:p>
+      </dgm:t>
     </dgm:pt>
     <dgm:pt modelId="{1E304393-B545-4646-ACCF-B4EBD4E4E64B}" type="pres">
       <dgm:prSet presAssocID="{003654E0-9E18-4D5E-982E-B9794BA45E9A}" presName="child2group" presStyleCnt="0"/>
@@ -1202,6 +1334,13 @@
     <dgm:pt modelId="{51FCF558-D603-4FFA-9BCD-09AEF65F6FC2}" type="pres">
       <dgm:prSet presAssocID="{003654E0-9E18-4D5E-982E-B9794BA45E9A}" presName="child2" presStyleLbl="bgAcc1" presStyleIdx="1" presStyleCnt="4"/>
       <dgm:spPr/>
+      <dgm:t>
+        <a:bodyPr/>
+        <a:lstStyle/>
+        <a:p>
+          <a:endParaRPr lang="en-US"/>
+        </a:p>
+      </dgm:t>
     </dgm:pt>
     <dgm:pt modelId="{0749C027-4B27-4B84-BFD3-16D8440F6A32}" type="pres">
       <dgm:prSet presAssocID="{003654E0-9E18-4D5E-982E-B9794BA45E9A}" presName="child2Text" presStyleLbl="bgAcc1" presStyleIdx="1" presStyleCnt="4">
@@ -1210,6 +1349,13 @@
         </dgm:presLayoutVars>
       </dgm:prSet>
       <dgm:spPr/>
+      <dgm:t>
+        <a:bodyPr/>
+        <a:lstStyle/>
+        <a:p>
+          <a:endParaRPr lang="en-US"/>
+        </a:p>
+      </dgm:t>
     </dgm:pt>
     <dgm:pt modelId="{1DC2898C-7A4C-40C0-B642-C211A7FD2C7D}" type="pres">
       <dgm:prSet presAssocID="{003654E0-9E18-4D5E-982E-B9794BA45E9A}" presName="child3group" presStyleCnt="0"/>
@@ -1218,6 +1364,13 @@
     <dgm:pt modelId="{089BF8AA-A8C8-467E-BB04-9D3FBCD354A8}" type="pres">
       <dgm:prSet presAssocID="{003654E0-9E18-4D5E-982E-B9794BA45E9A}" presName="child3" presStyleLbl="bgAcc1" presStyleIdx="2" presStyleCnt="4"/>
       <dgm:spPr/>
+      <dgm:t>
+        <a:bodyPr/>
+        <a:lstStyle/>
+        <a:p>
+          <a:endParaRPr lang="en-US"/>
+        </a:p>
+      </dgm:t>
     </dgm:pt>
     <dgm:pt modelId="{560839B1-6C83-4472-81FB-A55CE4A88370}" type="pres">
       <dgm:prSet presAssocID="{003654E0-9E18-4D5E-982E-B9794BA45E9A}" presName="child3Text" presStyleLbl="bgAcc1" presStyleIdx="2" presStyleCnt="4">
@@ -1226,6 +1379,13 @@
         </dgm:presLayoutVars>
       </dgm:prSet>
       <dgm:spPr/>
+      <dgm:t>
+        <a:bodyPr/>
+        <a:lstStyle/>
+        <a:p>
+          <a:endParaRPr lang="en-US"/>
+        </a:p>
+      </dgm:t>
     </dgm:pt>
     <dgm:pt modelId="{42AD15FB-06C4-4A5B-B01A-A1E68CA56757}" type="pres">
       <dgm:prSet presAssocID="{003654E0-9E18-4D5E-982E-B9794BA45E9A}" presName="child4group" presStyleCnt="0"/>
@@ -1234,6 +1394,13 @@
     <dgm:pt modelId="{FD063360-877F-494F-B6E0-C669D22636DB}" type="pres">
       <dgm:prSet presAssocID="{003654E0-9E18-4D5E-982E-B9794BA45E9A}" presName="child4" presStyleLbl="bgAcc1" presStyleIdx="3" presStyleCnt="4"/>
       <dgm:spPr/>
+      <dgm:t>
+        <a:bodyPr/>
+        <a:lstStyle/>
+        <a:p>
+          <a:endParaRPr lang="en-US"/>
+        </a:p>
+      </dgm:t>
     </dgm:pt>
     <dgm:pt modelId="{6882F1B9-F3A5-4D6C-8E1C-7A2A04343C7C}" type="pres">
       <dgm:prSet presAssocID="{003654E0-9E18-4D5E-982E-B9794BA45E9A}" presName="child4Text" presStyleLbl="bgAcc1" presStyleIdx="3" presStyleCnt="4">
@@ -1242,6 +1409,13 @@
         </dgm:presLayoutVars>
       </dgm:prSet>
       <dgm:spPr/>
+      <dgm:t>
+        <a:bodyPr/>
+        <a:lstStyle/>
+        <a:p>
+          <a:endParaRPr lang="en-US"/>
+        </a:p>
+      </dgm:t>
     </dgm:pt>
     <dgm:pt modelId="{BE2CBB36-39BC-41DE-88EB-49DECF328A8D}" type="pres">
       <dgm:prSet presAssocID="{003654E0-9E18-4D5E-982E-B9794BA45E9A}" presName="childPlaceholder" presStyleCnt="0"/>
@@ -1259,6 +1433,13 @@
         </dgm:presLayoutVars>
       </dgm:prSet>
       <dgm:spPr/>
+      <dgm:t>
+        <a:bodyPr/>
+        <a:lstStyle/>
+        <a:p>
+          <a:endParaRPr lang="en-US"/>
+        </a:p>
+      </dgm:t>
     </dgm:pt>
     <dgm:pt modelId="{47FAC8C8-7BE1-4962-8E2E-D0AFDDAB8BCB}" type="pres">
       <dgm:prSet presAssocID="{003654E0-9E18-4D5E-982E-B9794BA45E9A}" presName="quadrant2" presStyleLbl="node1" presStyleIdx="1" presStyleCnt="4">
@@ -1268,6 +1449,13 @@
         </dgm:presLayoutVars>
       </dgm:prSet>
       <dgm:spPr/>
+      <dgm:t>
+        <a:bodyPr/>
+        <a:lstStyle/>
+        <a:p>
+          <a:endParaRPr lang="en-US"/>
+        </a:p>
+      </dgm:t>
     </dgm:pt>
     <dgm:pt modelId="{C83C38A1-F622-4B41-891C-B4BDE13A7214}" type="pres">
       <dgm:prSet presAssocID="{003654E0-9E18-4D5E-982E-B9794BA45E9A}" presName="quadrant3" presStyleLbl="node1" presStyleIdx="2" presStyleCnt="4">
@@ -1293,6 +1481,13 @@
         </dgm:presLayoutVars>
       </dgm:prSet>
       <dgm:spPr/>
+      <dgm:t>
+        <a:bodyPr/>
+        <a:lstStyle/>
+        <a:p>
+          <a:endParaRPr lang="en-US"/>
+        </a:p>
+      </dgm:t>
     </dgm:pt>
     <dgm:pt modelId="{141FA543-C0FC-4852-BEB1-60C3A3DE27B5}" type="pres">
       <dgm:prSet presAssocID="{003654E0-9E18-4D5E-982E-B9794BA45E9A}" presName="quadrantPlaceholder" presStyleCnt="0"/>
@@ -1308,27 +1503,36 @@
     </dgm:pt>
   </dgm:ptLst>
   <dgm:cxnLst>
+    <dgm:cxn modelId="{D389E8FA-1497-4E63-93CA-37CD6DEEF0B4}" type="presOf" srcId="{2D441F45-7599-437B-9442-76606D6649FF}" destId="{089BF8AA-A8C8-467E-BB04-9D3FBCD354A8}" srcOrd="0" destOrd="2" presId="urn:microsoft.com/office/officeart/2005/8/layout/cycle4"/>
     <dgm:cxn modelId="{55AB6FEB-259F-4783-A4AD-9C48C7BED569}" type="presOf" srcId="{304AE478-6D78-4015-872C-96449D81B928}" destId="{560839B1-6C83-4472-81FB-A55CE4A88370}" srcOrd="1" destOrd="0" presId="urn:microsoft.com/office/officeart/2005/8/layout/cycle4"/>
-    <dgm:cxn modelId="{E2D4C9EB-EE0B-4625-968D-17652BF06CC0}" srcId="{003654E0-9E18-4D5E-982E-B9794BA45E9A}" destId="{4CCE717E-3DF3-496D-96B6-14B62FE6A965}" srcOrd="3" destOrd="0" parTransId="{4D8BCB9F-502C-4C58-8270-6CE8EEAD19EC}" sibTransId="{BFD8F682-3F4E-49DE-906B-38A5613F7665}"/>
+    <dgm:cxn modelId="{F09DB53F-C8E8-4D46-A1DD-3F4232FA8EB3}" type="presOf" srcId="{B0495E2F-C358-46B1-8AA5-E8E1AD53C78A}" destId="{560839B1-6C83-4472-81FB-A55CE4A88370}" srcOrd="1" destOrd="3" presId="urn:microsoft.com/office/officeart/2005/8/layout/cycle4"/>
+    <dgm:cxn modelId="{FC975CA1-FBA4-4159-B287-0698A51A2A71}" type="presOf" srcId="{4CCE717E-3DF3-496D-96B6-14B62FE6A965}" destId="{1A754D53-E6BA-454E-9AAD-0DF4E9D72B20}" srcOrd="0" destOrd="0" presId="urn:microsoft.com/office/officeart/2005/8/layout/cycle4"/>
+    <dgm:cxn modelId="{64C77EC9-CAAF-414B-9BF7-38B4BB9C5247}" type="presOf" srcId="{304AE478-6D78-4015-872C-96449D81B928}" destId="{089BF8AA-A8C8-467E-BB04-9D3FBCD354A8}" srcOrd="0" destOrd="0" presId="urn:microsoft.com/office/officeart/2005/8/layout/cycle4"/>
+    <dgm:cxn modelId="{F34C2597-9C0E-467A-AA1C-A4CE12FCBC69}" type="presOf" srcId="{DEAA4E0D-C8B5-4B30-8A24-B7699BC7060A}" destId="{089BF8AA-A8C8-467E-BB04-9D3FBCD354A8}" srcOrd="0" destOrd="1" presId="urn:microsoft.com/office/officeart/2005/8/layout/cycle4"/>
+    <dgm:cxn modelId="{601D0413-E462-47DF-A6E3-09FDAEC3359A}" type="presOf" srcId="{0724DAD8-2A69-4A1A-8F15-338B8B15E6F2}" destId="{51FCF558-D603-4FFA-9BCD-09AEF65F6FC2}" srcOrd="0" destOrd="0" presId="urn:microsoft.com/office/officeart/2005/8/layout/cycle4"/>
     <dgm:cxn modelId="{9AD95968-7506-4AF4-BCD0-5C1DFB0E5DC2}" type="presOf" srcId="{B2CCC5D8-B694-4307-90EF-DA94FDE9E13F}" destId="{6882F1B9-F3A5-4D6C-8E1C-7A2A04343C7C}" srcOrd="1" destOrd="0" presId="urn:microsoft.com/office/officeart/2005/8/layout/cycle4"/>
+    <dgm:cxn modelId="{3EA93CE7-9993-487E-97ED-D8FB1678C77D}" srcId="{003654E0-9E18-4D5E-982E-B9794BA45E9A}" destId="{3F8B8820-33BE-41F6-8C9D-CB004C05B899}" srcOrd="2" destOrd="0" parTransId="{01D3A64B-7D8F-4C8A-9559-CB9C2201D747}" sibTransId="{E7C6F197-2BAC-4B70-8004-D60E2FB73279}"/>
+    <dgm:cxn modelId="{76060151-B2A8-4433-A3A7-72E3BD32BC8A}" type="presOf" srcId="{6BD59895-F20B-4F11-AAF0-4DBB9E4B09A3}" destId="{C05466EF-19FA-453C-990A-DAAB7AC0AFD3}" srcOrd="0" destOrd="0" presId="urn:microsoft.com/office/officeart/2005/8/layout/cycle4"/>
     <dgm:cxn modelId="{97AD37F4-F38C-4200-8244-0F4969190F2B}" srcId="{003654E0-9E18-4D5E-982E-B9794BA45E9A}" destId="{599E7BAD-D9C8-4140-986F-65ED966AE095}" srcOrd="0" destOrd="0" parTransId="{71CF6D46-33FF-47FF-A47B-BE31BD4CC152}" sibTransId="{826A52B2-7700-4B45-B545-7B221F74AE69}"/>
-    <dgm:cxn modelId="{4D121755-B4CD-409E-83A9-D1A3901AB07E}" type="presOf" srcId="{599E7BAD-D9C8-4140-986F-65ED966AE095}" destId="{D61DF2A0-61BE-486A-9D59-BB3A3C9817A5}" srcOrd="0" destOrd="0" presId="urn:microsoft.com/office/officeart/2005/8/layout/cycle4"/>
+    <dgm:cxn modelId="{7D47BDCA-499F-4C58-B4BF-743D02652485}" srcId="{4CCE717E-3DF3-496D-96B6-14B62FE6A965}" destId="{B2CCC5D8-B694-4307-90EF-DA94FDE9E13F}" srcOrd="0" destOrd="0" parTransId="{48857B38-8F70-4172-BB19-54AE3B9822EB}" sibTransId="{9DE5CBD8-A66B-4661-B385-25E7B653CBBB}"/>
+    <dgm:cxn modelId="{48A24EC3-613C-495D-9246-A6F0D7D9950E}" srcId="{3F8B8820-33BE-41F6-8C9D-CB004C05B899}" destId="{DEAA4E0D-C8B5-4B30-8A24-B7699BC7060A}" srcOrd="1" destOrd="0" parTransId="{E2A376A5-DEEB-4719-B67C-5AA0AF71381F}" sibTransId="{A4408E63-3784-45E3-9BED-DDF87BDAB338}"/>
+    <dgm:cxn modelId="{0131F829-9C6E-4F01-99E1-5C1E26CEB42E}" srcId="{3F8B8820-33BE-41F6-8C9D-CB004C05B899}" destId="{B0495E2F-C358-46B1-8AA5-E8E1AD53C78A}" srcOrd="3" destOrd="0" parTransId="{F9D7900B-D534-43BD-9D97-DC822C9BB6D7}" sibTransId="{E9978469-DA08-469D-8E34-3783AFD57E56}"/>
     <dgm:cxn modelId="{2D6BE06D-8699-4D8C-8DC9-F85784EE3E94}" srcId="{3F8B8820-33BE-41F6-8C9D-CB004C05B899}" destId="{304AE478-6D78-4015-872C-96449D81B928}" srcOrd="0" destOrd="0" parTransId="{9B61C3E6-2FD2-4BE7-8E3A-74F1B9CEF8A0}" sibTransId="{9BA2EC1C-6DD4-40CB-A0BB-CB90F7F19AD8}"/>
-    <dgm:cxn modelId="{47C50A15-ACD0-40D5-B122-55572EE79D17}" type="presOf" srcId="{C1162557-9B22-4E88-A090-5FF51D5B8295}" destId="{47FAC8C8-7BE1-4962-8E2E-D0AFDDAB8BCB}" srcOrd="0" destOrd="0" presId="urn:microsoft.com/office/officeart/2005/8/layout/cycle4"/>
-    <dgm:cxn modelId="{7D47BDCA-499F-4C58-B4BF-743D02652485}" srcId="{4CCE717E-3DF3-496D-96B6-14B62FE6A965}" destId="{B2CCC5D8-B694-4307-90EF-DA94FDE9E13F}" srcOrd="0" destOrd="0" parTransId="{48857B38-8F70-4172-BB19-54AE3B9822EB}" sibTransId="{9DE5CBD8-A66B-4661-B385-25E7B653CBBB}"/>
-    <dgm:cxn modelId="{0E77C622-9118-4185-90C2-E63244288033}" type="presOf" srcId="{B2CCC5D8-B694-4307-90EF-DA94FDE9E13F}" destId="{FD063360-877F-494F-B6E0-C669D22636DB}" srcOrd="0" destOrd="0" presId="urn:microsoft.com/office/officeart/2005/8/layout/cycle4"/>
-    <dgm:cxn modelId="{722368D6-B795-4D23-84B3-11EA621EF861}" type="presOf" srcId="{6BD59895-F20B-4F11-AAF0-4DBB9E4B09A3}" destId="{526254A8-069C-4F53-8414-9E825075309B}" srcOrd="1" destOrd="0" presId="urn:microsoft.com/office/officeart/2005/8/layout/cycle4"/>
-    <dgm:cxn modelId="{64C77EC9-CAAF-414B-9BF7-38B4BB9C5247}" type="presOf" srcId="{304AE478-6D78-4015-872C-96449D81B928}" destId="{089BF8AA-A8C8-467E-BB04-9D3FBCD354A8}" srcOrd="0" destOrd="0" presId="urn:microsoft.com/office/officeart/2005/8/layout/cycle4"/>
-    <dgm:cxn modelId="{FC975CA1-FBA4-4159-B287-0698A51A2A71}" type="presOf" srcId="{4CCE717E-3DF3-496D-96B6-14B62FE6A965}" destId="{1A754D53-E6BA-454E-9AAD-0DF4E9D72B20}" srcOrd="0" destOrd="0" presId="urn:microsoft.com/office/officeart/2005/8/layout/cycle4"/>
-    <dgm:cxn modelId="{0F329598-6CAC-4DB4-996F-27934E3F0BB8}" srcId="{003654E0-9E18-4D5E-982E-B9794BA45E9A}" destId="{C1162557-9B22-4E88-A090-5FF51D5B8295}" srcOrd="1" destOrd="0" parTransId="{2191C118-335A-49FA-89A4-87D7CCA9BE16}" sibTransId="{A9641CE4-75BE-4FAA-91B5-93BFC98D9D72}"/>
-    <dgm:cxn modelId="{3EA93CE7-9993-487E-97ED-D8FB1678C77D}" srcId="{003654E0-9E18-4D5E-982E-B9794BA45E9A}" destId="{3F8B8820-33BE-41F6-8C9D-CB004C05B899}" srcOrd="2" destOrd="0" parTransId="{01D3A64B-7D8F-4C8A-9559-CB9C2201D747}" sibTransId="{E7C6F197-2BAC-4B70-8004-D60E2FB73279}"/>
-    <dgm:cxn modelId="{13F243A1-533B-4342-8CFE-D1EE32EA4B5E}" type="presOf" srcId="{003654E0-9E18-4D5E-982E-B9794BA45E9A}" destId="{15F91B88-19C7-4EFA-8B15-292C03FBB2EF}" srcOrd="0" destOrd="0" presId="urn:microsoft.com/office/officeart/2005/8/layout/cycle4"/>
-    <dgm:cxn modelId="{601D0413-E462-47DF-A6E3-09FDAEC3359A}" type="presOf" srcId="{0724DAD8-2A69-4A1A-8F15-338B8B15E6F2}" destId="{51FCF558-D603-4FFA-9BCD-09AEF65F6FC2}" srcOrd="0" destOrd="0" presId="urn:microsoft.com/office/officeart/2005/8/layout/cycle4"/>
-    <dgm:cxn modelId="{76060151-B2A8-4433-A3A7-72E3BD32BC8A}" type="presOf" srcId="{6BD59895-F20B-4F11-AAF0-4DBB9E4B09A3}" destId="{C05466EF-19FA-453C-990A-DAAB7AC0AFD3}" srcOrd="0" destOrd="0" presId="urn:microsoft.com/office/officeart/2005/8/layout/cycle4"/>
-    <dgm:cxn modelId="{2A088761-D1CB-496D-9145-0794B8A3803F}" type="presOf" srcId="{3F8B8820-33BE-41F6-8C9D-CB004C05B899}" destId="{C83C38A1-F622-4B41-891C-B4BDE13A7214}" srcOrd="0" destOrd="0" presId="urn:microsoft.com/office/officeart/2005/8/layout/cycle4"/>
     <dgm:cxn modelId="{458E33E6-4CAA-4C6A-B5EA-81E128FE692A}" srcId="{C1162557-9B22-4E88-A090-5FF51D5B8295}" destId="{0724DAD8-2A69-4A1A-8F15-338B8B15E6F2}" srcOrd="0" destOrd="0" parTransId="{16EF8677-2289-48A6-92BB-A7F00928933E}" sibTransId="{C39FC2A2-A0AE-4238-8780-E13778590D70}"/>
     <dgm:cxn modelId="{A1F816E3-F8FB-4CC5-BF37-58D48E28ACB2}" type="presOf" srcId="{0724DAD8-2A69-4A1A-8F15-338B8B15E6F2}" destId="{0749C027-4B27-4B84-BFD3-16D8440F6A32}" srcOrd="1" destOrd="0" presId="urn:microsoft.com/office/officeart/2005/8/layout/cycle4"/>
+    <dgm:cxn modelId="{13F243A1-533B-4342-8CFE-D1EE32EA4B5E}" type="presOf" srcId="{003654E0-9E18-4D5E-982E-B9794BA45E9A}" destId="{15F91B88-19C7-4EFA-8B15-292C03FBB2EF}" srcOrd="0" destOrd="0" presId="urn:microsoft.com/office/officeart/2005/8/layout/cycle4"/>
+    <dgm:cxn modelId="{722368D6-B795-4D23-84B3-11EA621EF861}" type="presOf" srcId="{6BD59895-F20B-4F11-AAF0-4DBB9E4B09A3}" destId="{526254A8-069C-4F53-8414-9E825075309B}" srcOrd="1" destOrd="0" presId="urn:microsoft.com/office/officeart/2005/8/layout/cycle4"/>
+    <dgm:cxn modelId="{3A65B518-8851-4AF7-A603-46DE3CD6D2BC}" type="presOf" srcId="{2D441F45-7599-437B-9442-76606D6649FF}" destId="{560839B1-6C83-4472-81FB-A55CE4A88370}" srcOrd="1" destOrd="2" presId="urn:microsoft.com/office/officeart/2005/8/layout/cycle4"/>
+    <dgm:cxn modelId="{E2D4C9EB-EE0B-4625-968D-17652BF06CC0}" srcId="{003654E0-9E18-4D5E-982E-B9794BA45E9A}" destId="{4CCE717E-3DF3-496D-96B6-14B62FE6A965}" srcOrd="3" destOrd="0" parTransId="{4D8BCB9F-502C-4C58-8270-6CE8EEAD19EC}" sibTransId="{BFD8F682-3F4E-49DE-906B-38A5613F7665}"/>
+    <dgm:cxn modelId="{47C50A15-ACD0-40D5-B122-55572EE79D17}" type="presOf" srcId="{C1162557-9B22-4E88-A090-5FF51D5B8295}" destId="{47FAC8C8-7BE1-4962-8E2E-D0AFDDAB8BCB}" srcOrd="0" destOrd="0" presId="urn:microsoft.com/office/officeart/2005/8/layout/cycle4"/>
+    <dgm:cxn modelId="{D33198E3-24C6-403A-9942-AFA9AA6F2642}" srcId="{3F8B8820-33BE-41F6-8C9D-CB004C05B899}" destId="{2D441F45-7599-437B-9442-76606D6649FF}" srcOrd="2" destOrd="0" parTransId="{B8E78C7C-7573-44A9-BF7F-EDF3AF38CA63}" sibTransId="{FF5D76AD-0625-4B5F-B851-5B4644CD56C1}"/>
     <dgm:cxn modelId="{AF512D4B-9F3E-49E0-85E7-B842EE6BF609}" srcId="{599E7BAD-D9C8-4140-986F-65ED966AE095}" destId="{6BD59895-F20B-4F11-AAF0-4DBB9E4B09A3}" srcOrd="0" destOrd="0" parTransId="{43165439-FD40-4572-BFA2-0E332F7AC200}" sibTransId="{576F2714-2620-4DD8-A983-23EA4E9C8EAB}"/>
+    <dgm:cxn modelId="{399CD453-098C-4642-B063-B2521960DC1E}" type="presOf" srcId="{DEAA4E0D-C8B5-4B30-8A24-B7699BC7060A}" destId="{560839B1-6C83-4472-81FB-A55CE4A88370}" srcOrd="1" destOrd="1" presId="urn:microsoft.com/office/officeart/2005/8/layout/cycle4"/>
+    <dgm:cxn modelId="{F3C0D508-46A5-4423-8D07-31C407679DD8}" type="presOf" srcId="{B0495E2F-C358-46B1-8AA5-E8E1AD53C78A}" destId="{089BF8AA-A8C8-467E-BB04-9D3FBCD354A8}" srcOrd="0" destOrd="3" presId="urn:microsoft.com/office/officeart/2005/8/layout/cycle4"/>
+    <dgm:cxn modelId="{0F329598-6CAC-4DB4-996F-27934E3F0BB8}" srcId="{003654E0-9E18-4D5E-982E-B9794BA45E9A}" destId="{C1162557-9B22-4E88-A090-5FF51D5B8295}" srcOrd="1" destOrd="0" parTransId="{2191C118-335A-49FA-89A4-87D7CCA9BE16}" sibTransId="{A9641CE4-75BE-4FAA-91B5-93BFC98D9D72}"/>
+    <dgm:cxn modelId="{2A088761-D1CB-496D-9145-0794B8A3803F}" type="presOf" srcId="{3F8B8820-33BE-41F6-8C9D-CB004C05B899}" destId="{C83C38A1-F622-4B41-891C-B4BDE13A7214}" srcOrd="0" destOrd="0" presId="urn:microsoft.com/office/officeart/2005/8/layout/cycle4"/>
+    <dgm:cxn modelId="{4D121755-B4CD-409E-83A9-D1A3901AB07E}" type="presOf" srcId="{599E7BAD-D9C8-4140-986F-65ED966AE095}" destId="{D61DF2A0-61BE-486A-9D59-BB3A3C9817A5}" srcOrd="0" destOrd="0" presId="urn:microsoft.com/office/officeart/2005/8/layout/cycle4"/>
+    <dgm:cxn modelId="{0E77C622-9118-4185-90C2-E63244288033}" type="presOf" srcId="{B2CCC5D8-B694-4307-90EF-DA94FDE9E13F}" destId="{FD063360-877F-494F-B6E0-C669D22636DB}" srcOrd="0" destOrd="0" presId="urn:microsoft.com/office/officeart/2005/8/layout/cycle4"/>
     <dgm:cxn modelId="{BC163FCC-596A-4CA1-BF0F-7ABB7709263D}" type="presParOf" srcId="{15F91B88-19C7-4EFA-8B15-292C03FBB2EF}" destId="{77E2984E-B177-46C9-A01F-4DFD59131FBB}" srcOrd="0" destOrd="0" presId="urn:microsoft.com/office/officeart/2005/8/layout/cycle4"/>
     <dgm:cxn modelId="{177DA972-11A8-4EE4-86D0-197D023416EE}" type="presParOf" srcId="{77E2984E-B177-46C9-A01F-4DFD59131FBB}" destId="{EA121366-D4D8-431F-9558-3AF41209029F}" srcOrd="0" destOrd="0" presId="urn:microsoft.com/office/officeart/2005/8/layout/cycle4"/>
     <dgm:cxn modelId="{5A78C5F0-726B-41BD-BA2E-D0C94B1182E4}" type="presParOf" srcId="{EA121366-D4D8-431F-9558-3AF41209029F}" destId="{C05466EF-19FA-453C-990A-DAAB7AC0AFD3}" srcOrd="0" destOrd="0" presId="urn:microsoft.com/office/officeart/2005/8/layout/cycle4"/>
@@ -3314,7 +3518,7 @@
           <a:p>
             <a:fld id="{1955BB84-5AF2-4988-8033-11E59F804EC0}" type="datetimeFigureOut">
               <a:rPr lang="en-US" smtClean="0"/>
-              <a:t>2/7/2019</a:t>
+              <a:t>2/19/2019</a:t>
             </a:fld>
             <a:endParaRPr lang="en-US"/>
           </a:p>
@@ -3484,7 +3688,7 @@
           <a:p>
             <a:fld id="{1955BB84-5AF2-4988-8033-11E59F804EC0}" type="datetimeFigureOut">
               <a:rPr lang="en-US" smtClean="0"/>
-              <a:t>2/7/2019</a:t>
+              <a:t>2/19/2019</a:t>
             </a:fld>
             <a:endParaRPr lang="en-US"/>
           </a:p>
@@ -3664,7 +3868,7 @@
           <a:p>
             <a:fld id="{1955BB84-5AF2-4988-8033-11E59F804EC0}" type="datetimeFigureOut">
               <a:rPr lang="en-US" smtClean="0"/>
-              <a:t>2/7/2019</a:t>
+              <a:t>2/19/2019</a:t>
             </a:fld>
             <a:endParaRPr lang="en-US"/>
           </a:p>
@@ -3834,7 +4038,7 @@
           <a:p>
             <a:fld id="{1955BB84-5AF2-4988-8033-11E59F804EC0}" type="datetimeFigureOut">
               <a:rPr lang="en-US" smtClean="0"/>
-              <a:t>2/7/2019</a:t>
+              <a:t>2/19/2019</a:t>
             </a:fld>
             <a:endParaRPr lang="en-US"/>
           </a:p>
@@ -4080,7 +4284,7 @@
           <a:p>
             <a:fld id="{1955BB84-5AF2-4988-8033-11E59F804EC0}" type="datetimeFigureOut">
               <a:rPr lang="en-US" smtClean="0"/>
-              <a:t>2/7/2019</a:t>
+              <a:t>2/19/2019</a:t>
             </a:fld>
             <a:endParaRPr lang="en-US"/>
           </a:p>
@@ -4368,7 +4572,7 @@
           <a:p>
             <a:fld id="{1955BB84-5AF2-4988-8033-11E59F804EC0}" type="datetimeFigureOut">
               <a:rPr lang="en-US" smtClean="0"/>
-              <a:t>2/7/2019</a:t>
+              <a:t>2/19/2019</a:t>
             </a:fld>
             <a:endParaRPr lang="en-US"/>
           </a:p>
@@ -4790,7 +4994,7 @@
           <a:p>
             <a:fld id="{1955BB84-5AF2-4988-8033-11E59F804EC0}" type="datetimeFigureOut">
               <a:rPr lang="en-US" smtClean="0"/>
-              <a:t>2/7/2019</a:t>
+              <a:t>2/19/2019</a:t>
             </a:fld>
             <a:endParaRPr lang="en-US"/>
           </a:p>
@@ -4908,7 +5112,7 @@
           <a:p>
             <a:fld id="{1955BB84-5AF2-4988-8033-11E59F804EC0}" type="datetimeFigureOut">
               <a:rPr lang="en-US" smtClean="0"/>
-              <a:t>2/7/2019</a:t>
+              <a:t>2/19/2019</a:t>
             </a:fld>
             <a:endParaRPr lang="en-US"/>
           </a:p>
@@ -5003,7 +5207,7 @@
           <a:p>
             <a:fld id="{1955BB84-5AF2-4988-8033-11E59F804EC0}" type="datetimeFigureOut">
               <a:rPr lang="en-US" smtClean="0"/>
-              <a:t>2/7/2019</a:t>
+              <a:t>2/19/2019</a:t>
             </a:fld>
             <a:endParaRPr lang="en-US"/>
           </a:p>
@@ -5280,7 +5484,7 @@
           <a:p>
             <a:fld id="{1955BB84-5AF2-4988-8033-11E59F804EC0}" type="datetimeFigureOut">
               <a:rPr lang="en-US" smtClean="0"/>
-              <a:t>2/7/2019</a:t>
+              <a:t>2/19/2019</a:t>
             </a:fld>
             <a:endParaRPr lang="en-US"/>
           </a:p>
@@ -5533,7 +5737,7 @@
           <a:p>
             <a:fld id="{1955BB84-5AF2-4988-8033-11E59F804EC0}" type="datetimeFigureOut">
               <a:rPr lang="en-US" smtClean="0"/>
-              <a:t>2/7/2019</a:t>
+              <a:t>2/19/2019</a:t>
             </a:fld>
             <a:endParaRPr lang="en-US"/>
           </a:p>
@@ -5746,7 +5950,7 @@
           <a:p>
             <a:fld id="{1955BB84-5AF2-4988-8033-11E59F804EC0}" type="datetimeFigureOut">
               <a:rPr lang="en-US" smtClean="0"/>
-              <a:t>2/7/2019</a:t>
+              <a:t>2/19/2019</a:t>
             </a:fld>
             <a:endParaRPr lang="en-US"/>
           </a:p>
@@ -6128,7 +6332,7 @@
           <p:nvPr>
             <p:extLst>
               <p:ext uri="{D42A27DB-BD31-4B8C-83A1-F6EECF244321}">
-                <p14:modId xmlns:p14="http://schemas.microsoft.com/office/powerpoint/2010/main" val="3430242285"/>
+                <p14:modId xmlns:p14="http://schemas.microsoft.com/office/powerpoint/2010/main" val="2408413940"/>
               </p:ext>
             </p:extLst>
           </p:nvPr>

</xml_diff>

<commit_message>
oox smartart, cycle matrix: fix fill and line props of shape
The topmost shape may not have 0 depth, but something larger.

In that case at least it's safe to still use fill & line properties. The
B1 quadrant of the test file now has the proper orange background, and
B2's border is also properly orange.

Change-Id: Iccc5f6993693a0f1cf8f50d163003c24d3ad690e
Reviewed-on: https://gerrit.libreoffice.org/68104
Reviewed-by: Miklos Vajna <vmiklos@collabora.com>
Tested-by: Jenkins
</commit_message>
<xml_diff>
--- a/sd/qa/unit/data/pptx/smartart-cycle-matrix.pptx
+++ b/sd/qa/unit/data/pptx/smartart-cycle-matrix.pptx
@@ -944,7 +944,11 @@
     </dgm:pt>
     <dgm:pt modelId="{C1162557-9B22-4E88-A090-5FF51D5B8295}">
       <dgm:prSet phldrT="[Text]"/>
-      <dgm:spPr/>
+      <dgm:spPr>
+        <a:solidFill>
+          <a:schemeClr val="accent6"/>
+        </a:solidFill>
+      </dgm:spPr>
       <dgm:t>
         <a:bodyPr/>
         <a:lstStyle/>
@@ -981,7 +985,13 @@
     </dgm:pt>
     <dgm:pt modelId="{0724DAD8-2A69-4A1A-8F15-338B8B15E6F2}">
       <dgm:prSet phldrT="[Text]"/>
-      <dgm:spPr/>
+      <dgm:spPr>
+        <a:ln w="28575">
+          <a:solidFill>
+            <a:schemeClr val="accent6"/>
+          </a:solidFill>
+        </a:ln>
+      </dgm:spPr>
       <dgm:t>
         <a:bodyPr/>
         <a:lstStyle/>

</xml_diff>